<commit_message>
Update gitbook 2024-06-18 14:13:07
</commit_message>
<xml_diff>
--- a/MeetTeam.pptx
+++ b/MeetTeam.pptx
@@ -215,7 +215,7 @@
           <a:p>
             <a:fld id="{7CF2004C-AD6B-4A9A-A490-3730F26EBC0C}" type="datetimeFigureOut">
               <a:rPr lang="en-US" smtClean="0"/>
-              <a:t>6/17/2024</a:t>
+              <a:t>6/18/2024</a:t>
             </a:fld>
             <a:endParaRPr lang="en-US"/>
           </a:p>
@@ -613,7 +613,7 @@
           <a:p>
             <a:fld id="{2E6CAD52-DA28-4E78-92DA-C35A0DBEE03A}" type="datetimeFigureOut">
               <a:rPr lang="en-US" smtClean="0"/>
-              <a:t>6/17/2024</a:t>
+              <a:t>6/18/2024</a:t>
             </a:fld>
             <a:endParaRPr lang="en-US"/>
           </a:p>
@@ -783,7 +783,7 @@
           <a:p>
             <a:fld id="{2E6CAD52-DA28-4E78-92DA-C35A0DBEE03A}" type="datetimeFigureOut">
               <a:rPr lang="en-US" smtClean="0"/>
-              <a:t>6/17/2024</a:t>
+              <a:t>6/18/2024</a:t>
             </a:fld>
             <a:endParaRPr lang="en-US"/>
           </a:p>
@@ -963,7 +963,7 @@
           <a:p>
             <a:fld id="{2E6CAD52-DA28-4E78-92DA-C35A0DBEE03A}" type="datetimeFigureOut">
               <a:rPr lang="en-US" smtClean="0"/>
-              <a:t>6/17/2024</a:t>
+              <a:t>6/18/2024</a:t>
             </a:fld>
             <a:endParaRPr lang="en-US"/>
           </a:p>
@@ -1133,7 +1133,7 @@
           <a:p>
             <a:fld id="{2E6CAD52-DA28-4E78-92DA-C35A0DBEE03A}" type="datetimeFigureOut">
               <a:rPr lang="en-US" smtClean="0"/>
-              <a:t>6/17/2024</a:t>
+              <a:t>6/18/2024</a:t>
             </a:fld>
             <a:endParaRPr lang="en-US"/>
           </a:p>
@@ -1379,7 +1379,7 @@
           <a:p>
             <a:fld id="{2E6CAD52-DA28-4E78-92DA-C35A0DBEE03A}" type="datetimeFigureOut">
               <a:rPr lang="en-US" smtClean="0"/>
-              <a:t>6/17/2024</a:t>
+              <a:t>6/18/2024</a:t>
             </a:fld>
             <a:endParaRPr lang="en-US"/>
           </a:p>
@@ -1611,7 +1611,7 @@
           <a:p>
             <a:fld id="{2E6CAD52-DA28-4E78-92DA-C35A0DBEE03A}" type="datetimeFigureOut">
               <a:rPr lang="en-US" smtClean="0"/>
-              <a:t>6/17/2024</a:t>
+              <a:t>6/18/2024</a:t>
             </a:fld>
             <a:endParaRPr lang="en-US"/>
           </a:p>
@@ -1978,7 +1978,7 @@
           <a:p>
             <a:fld id="{2E6CAD52-DA28-4E78-92DA-C35A0DBEE03A}" type="datetimeFigureOut">
               <a:rPr lang="en-US" smtClean="0"/>
-              <a:t>6/17/2024</a:t>
+              <a:t>6/18/2024</a:t>
             </a:fld>
             <a:endParaRPr lang="en-US"/>
           </a:p>
@@ -2096,7 +2096,7 @@
           <a:p>
             <a:fld id="{2E6CAD52-DA28-4E78-92DA-C35A0DBEE03A}" type="datetimeFigureOut">
               <a:rPr lang="en-US" smtClean="0"/>
-              <a:t>6/17/2024</a:t>
+              <a:t>6/18/2024</a:t>
             </a:fld>
             <a:endParaRPr lang="en-US"/>
           </a:p>
@@ -2191,7 +2191,7 @@
           <a:p>
             <a:fld id="{2E6CAD52-DA28-4E78-92DA-C35A0DBEE03A}" type="datetimeFigureOut">
               <a:rPr lang="en-US" smtClean="0"/>
-              <a:t>6/17/2024</a:t>
+              <a:t>6/18/2024</a:t>
             </a:fld>
             <a:endParaRPr lang="en-US"/>
           </a:p>
@@ -2468,7 +2468,7 @@
           <a:p>
             <a:fld id="{2E6CAD52-DA28-4E78-92DA-C35A0DBEE03A}" type="datetimeFigureOut">
               <a:rPr lang="en-US" smtClean="0"/>
-              <a:t>6/17/2024</a:t>
+              <a:t>6/18/2024</a:t>
             </a:fld>
             <a:endParaRPr lang="en-US"/>
           </a:p>
@@ -2725,7 +2725,7 @@
           <a:p>
             <a:fld id="{2E6CAD52-DA28-4E78-92DA-C35A0DBEE03A}" type="datetimeFigureOut">
               <a:rPr lang="en-US" smtClean="0"/>
-              <a:t>6/17/2024</a:t>
+              <a:t>6/18/2024</a:t>
             </a:fld>
             <a:endParaRPr lang="en-US"/>
           </a:p>
@@ -2938,7 +2938,7 @@
           <a:p>
             <a:fld id="{2E6CAD52-DA28-4E78-92DA-C35A0DBEE03A}" type="datetimeFigureOut">
               <a:rPr lang="en-US" smtClean="0"/>
-              <a:t>6/17/2024</a:t>
+              <a:t>6/18/2024</a:t>
             </a:fld>
             <a:endParaRPr lang="en-US"/>
           </a:p>
@@ -4638,8 +4638,13 @@
           <a:p>
             <a:r>
               <a:rPr lang="en-US" i="1" dirty="0"/>
-              <a:t>you are free to go</a:t>
-            </a:r>
+              <a:t>lunch </a:t>
+            </a:r>
+            <a:r>
+              <a:rPr lang="en-US" i="1"/>
+              <a:t>is next!</a:t>
+            </a:r>
+            <a:endParaRPr lang="en-US" i="1" dirty="0"/>
           </a:p>
         </p:txBody>
       </p:sp>

</xml_diff>

<commit_message>
Update gitbook 2024-06-18 16:28:06
</commit_message>
<xml_diff>
--- a/MeetTeam.pptx
+++ b/MeetTeam.pptx
@@ -3371,8 +3371,32 @@
           <a:p>
             <a:r>
               <a:rPr lang="en-US" dirty="0"/>
-              <a:t>Meet Your Team </a:t>
-            </a:r>
+              <a:t>App Project 2024</a:t>
+            </a:r>
+          </a:p>
+        </p:txBody>
+      </p:sp>
+      <p:sp>
+        <p:nvSpPr>
+          <p:cNvPr id="3" name="Subtitle 2">
+            <a:extLst>
+              <a:ext uri="{FF2B5EF4-FFF2-40B4-BE49-F238E27FC236}">
+                <a16:creationId xmlns:a16="http://schemas.microsoft.com/office/drawing/2014/main" id="{16FDD527-07D6-378F-63C7-48A7228485C1}"/>
+              </a:ext>
+            </a:extLst>
+          </p:cNvPr>
+          <p:cNvSpPr>
+            <a:spLocks noGrp="1"/>
+          </p:cNvSpPr>
+          <p:nvPr>
+            <p:ph type="subTitle" idx="1"/>
+          </p:nvPr>
+        </p:nvSpPr>
+        <p:spPr/>
+        <p:txBody>
+          <a:bodyPr/>
+          <a:lstStyle/>
+          <a:p>
             <a:r>
               <a:rPr lang="en-US" dirty="0">
                 <a:solidFill>
@@ -3383,35 +3407,10 @@
                 </a:highlight>
                 <a:latin typeface="Inter" panose="02000503000000020004" pitchFamily="2" charset="0"/>
               </a:rPr>
-              <a:t>👋</a:t>
-            </a:r>
-            <a:endParaRPr lang="en-US" dirty="0"/>
-          </a:p>
-        </p:txBody>
-      </p:sp>
-      <p:sp>
-        <p:nvSpPr>
-          <p:cNvPr id="3" name="Subtitle 2">
-            <a:extLst>
-              <a:ext uri="{FF2B5EF4-FFF2-40B4-BE49-F238E27FC236}">
-                <a16:creationId xmlns:a16="http://schemas.microsoft.com/office/drawing/2014/main" id="{16FDD527-07D6-378F-63C7-48A7228485C1}"/>
-              </a:ext>
-            </a:extLst>
-          </p:cNvPr>
-          <p:cNvSpPr>
-            <a:spLocks noGrp="1"/>
-          </p:cNvSpPr>
-          <p:nvPr>
-            <p:ph type="subTitle" idx="1"/>
-          </p:nvPr>
-        </p:nvSpPr>
-        <p:spPr/>
-        <p:txBody>
-          <a:bodyPr/>
-          <a:lstStyle/>
-          <a:p>
-            <a:r>
-              <a:rPr lang="en-US" dirty="0">
+              <a:t>Meet </a:t>
+            </a:r>
+            <a:r>
+              <a:rPr lang="en-US">
                 <a:solidFill>
                   <a:srgbClr val="333333"/>
                 </a:solidFill>
@@ -3420,7 +3419,7 @@
                 </a:highlight>
                 <a:latin typeface="Inter" panose="02000503000000020004" pitchFamily="2" charset="0"/>
               </a:rPr>
-              <a:t>App Project 2024</a:t>
+              <a:t>Your Team 👋</a:t>
             </a:r>
             <a:endParaRPr lang="en-US" dirty="0"/>
           </a:p>

</xml_diff>

<commit_message>
Update gitbook 2025-06-04 20:36:49
</commit_message>
<xml_diff>
--- a/MeetTeam.pptx
+++ b/MeetTeam.pptx
@@ -215,7 +215,7 @@
           <a:p>
             <a:fld id="{7CF2004C-AD6B-4A9A-A490-3730F26EBC0C}" type="datetimeFigureOut">
               <a:rPr lang="en-US" smtClean="0"/>
-              <a:t>6/18/2024</a:t>
+              <a:t>6/4/2025</a:t>
             </a:fld>
             <a:endParaRPr lang="en-US"/>
           </a:p>
@@ -613,7 +613,7 @@
           <a:p>
             <a:fld id="{2E6CAD52-DA28-4E78-92DA-C35A0DBEE03A}" type="datetimeFigureOut">
               <a:rPr lang="en-US" smtClean="0"/>
-              <a:t>6/18/2024</a:t>
+              <a:t>6/4/2025</a:t>
             </a:fld>
             <a:endParaRPr lang="en-US"/>
           </a:p>
@@ -783,7 +783,7 @@
           <a:p>
             <a:fld id="{2E6CAD52-DA28-4E78-92DA-C35A0DBEE03A}" type="datetimeFigureOut">
               <a:rPr lang="en-US" smtClean="0"/>
-              <a:t>6/18/2024</a:t>
+              <a:t>6/4/2025</a:t>
             </a:fld>
             <a:endParaRPr lang="en-US"/>
           </a:p>
@@ -963,7 +963,7 @@
           <a:p>
             <a:fld id="{2E6CAD52-DA28-4E78-92DA-C35A0DBEE03A}" type="datetimeFigureOut">
               <a:rPr lang="en-US" smtClean="0"/>
-              <a:t>6/18/2024</a:t>
+              <a:t>6/4/2025</a:t>
             </a:fld>
             <a:endParaRPr lang="en-US"/>
           </a:p>
@@ -1133,7 +1133,7 @@
           <a:p>
             <a:fld id="{2E6CAD52-DA28-4E78-92DA-C35A0DBEE03A}" type="datetimeFigureOut">
               <a:rPr lang="en-US" smtClean="0"/>
-              <a:t>6/18/2024</a:t>
+              <a:t>6/4/2025</a:t>
             </a:fld>
             <a:endParaRPr lang="en-US"/>
           </a:p>
@@ -1379,7 +1379,7 @@
           <a:p>
             <a:fld id="{2E6CAD52-DA28-4E78-92DA-C35A0DBEE03A}" type="datetimeFigureOut">
               <a:rPr lang="en-US" smtClean="0"/>
-              <a:t>6/18/2024</a:t>
+              <a:t>6/4/2025</a:t>
             </a:fld>
             <a:endParaRPr lang="en-US"/>
           </a:p>
@@ -1611,7 +1611,7 @@
           <a:p>
             <a:fld id="{2E6CAD52-DA28-4E78-92DA-C35A0DBEE03A}" type="datetimeFigureOut">
               <a:rPr lang="en-US" smtClean="0"/>
-              <a:t>6/18/2024</a:t>
+              <a:t>6/4/2025</a:t>
             </a:fld>
             <a:endParaRPr lang="en-US"/>
           </a:p>
@@ -1978,7 +1978,7 @@
           <a:p>
             <a:fld id="{2E6CAD52-DA28-4E78-92DA-C35A0DBEE03A}" type="datetimeFigureOut">
               <a:rPr lang="en-US" smtClean="0"/>
-              <a:t>6/18/2024</a:t>
+              <a:t>6/4/2025</a:t>
             </a:fld>
             <a:endParaRPr lang="en-US"/>
           </a:p>
@@ -2096,7 +2096,7 @@
           <a:p>
             <a:fld id="{2E6CAD52-DA28-4E78-92DA-C35A0DBEE03A}" type="datetimeFigureOut">
               <a:rPr lang="en-US" smtClean="0"/>
-              <a:t>6/18/2024</a:t>
+              <a:t>6/4/2025</a:t>
             </a:fld>
             <a:endParaRPr lang="en-US"/>
           </a:p>
@@ -2191,7 +2191,7 @@
           <a:p>
             <a:fld id="{2E6CAD52-DA28-4E78-92DA-C35A0DBEE03A}" type="datetimeFigureOut">
               <a:rPr lang="en-US" smtClean="0"/>
-              <a:t>6/18/2024</a:t>
+              <a:t>6/4/2025</a:t>
             </a:fld>
             <a:endParaRPr lang="en-US"/>
           </a:p>
@@ -2468,7 +2468,7 @@
           <a:p>
             <a:fld id="{2E6CAD52-DA28-4E78-92DA-C35A0DBEE03A}" type="datetimeFigureOut">
               <a:rPr lang="en-US" smtClean="0"/>
-              <a:t>6/18/2024</a:t>
+              <a:t>6/4/2025</a:t>
             </a:fld>
             <a:endParaRPr lang="en-US"/>
           </a:p>
@@ -2725,7 +2725,7 @@
           <a:p>
             <a:fld id="{2E6CAD52-DA28-4E78-92DA-C35A0DBEE03A}" type="datetimeFigureOut">
               <a:rPr lang="en-US" smtClean="0"/>
-              <a:t>6/18/2024</a:t>
+              <a:t>6/4/2025</a:t>
             </a:fld>
             <a:endParaRPr lang="en-US"/>
           </a:p>
@@ -2938,7 +2938,7 @@
           <a:p>
             <a:fld id="{2E6CAD52-DA28-4E78-92DA-C35A0DBEE03A}" type="datetimeFigureOut">
               <a:rPr lang="en-US" smtClean="0"/>
-              <a:t>6/18/2024</a:t>
+              <a:t>6/4/2025</a:t>
             </a:fld>
             <a:endParaRPr lang="en-US"/>
           </a:p>
@@ -3371,7 +3371,7 @@
           <a:p>
             <a:r>
               <a:rPr lang="en-US" dirty="0"/>
-              <a:t>App Project 2024</a:t>
+              <a:t>PEEKE Project 2025</a:t>
             </a:r>
           </a:p>
         </p:txBody>
@@ -3667,56 +3667,29 @@
         </p:nvSpPr>
         <p:spPr>
           <a:xfrm>
-            <a:off x="838200" y="1825625"/>
+            <a:off x="722586" y="2701925"/>
             <a:ext cx="10515600" cy="727075"/>
           </a:xfrm>
         </p:spPr>
         <p:txBody>
-          <a:bodyPr/>
+          <a:bodyPr>
+            <a:normAutofit/>
+          </a:bodyPr>
           <a:lstStyle/>
           <a:p>
             <a:pPr marL="0" indent="0">
               <a:buNone/>
             </a:pPr>
             <a:r>
-              <a:rPr lang="en-US" dirty="0">
+              <a:rPr lang="en-US" sz="3200" dirty="0">
                 <a:hlinkClick r:id="rId2"/>
               </a:rPr>
-              <a:t>https://hylandtechoutreach.github.io/app-internship-2024</a:t>
-            </a:r>
-            <a:endParaRPr lang="en-US" dirty="0"/>
-          </a:p>
-        </p:txBody>
-      </p:sp>
-      <p:pic>
-        <p:nvPicPr>
-          <p:cNvPr id="5" name="Picture 4">
-            <a:extLst>
-              <a:ext uri="{FF2B5EF4-FFF2-40B4-BE49-F238E27FC236}">
-                <a16:creationId xmlns:a16="http://schemas.microsoft.com/office/drawing/2014/main" id="{6B84DF6F-89E9-BBBC-86C9-988D99B0D6D5}"/>
-              </a:ext>
-            </a:extLst>
-          </p:cNvPr>
-          <p:cNvPicPr>
-            <a:picLocks noChangeAspect="1"/>
-          </p:cNvPicPr>
-          <p:nvPr/>
-        </p:nvPicPr>
-        <p:blipFill rotWithShape="1">
-          <a:blip r:embed="rId3"/>
-          <a:srcRect b="27529"/>
-          <a:stretch/>
-        </p:blipFill>
-        <p:spPr>
-          <a:xfrm>
-            <a:off x="0" y="2447153"/>
-            <a:ext cx="12192000" cy="4410847"/>
-          </a:xfrm>
-          <a:prstGeom prst="rect">
-            <a:avLst/>
-          </a:prstGeom>
-        </p:spPr>
-      </p:pic>
+              <a:t>hylandtechoutreach.github.io/peeke-internship-2025</a:t>
+            </a:r>
+            <a:endParaRPr lang="en-US" sz="3200" dirty="0"/>
+          </a:p>
+        </p:txBody>
+      </p:sp>
     </p:spTree>
     <p:extLst>
       <p:ext uri="{BB962C8B-B14F-4D97-AF65-F5344CB8AC3E}">
@@ -3799,41 +3772,41 @@
           <a:lstStyle/>
           <a:p>
             <a:r>
-              <a:rPr lang="en-US" sz="4800" dirty="0"/>
+              <a:rPr lang="en-US" sz="4400" dirty="0"/>
               <a:t>Philosophy &amp; Goals: </a:t>
             </a:r>
             <a:r>
-              <a:rPr lang="en-US" sz="4800" b="1" dirty="0"/>
+              <a:rPr lang="en-US" sz="4400" b="1" dirty="0"/>
               <a:t>it’s up to you</a:t>
             </a:r>
           </a:p>
           <a:p>
             <a:r>
-              <a:rPr lang="en-US" sz="4800" dirty="0"/>
+              <a:rPr lang="en-US" sz="4400" dirty="0"/>
               <a:t>Project: </a:t>
             </a:r>
             <a:r>
-              <a:rPr lang="en-US" sz="4800" b="1" dirty="0"/>
-              <a:t>AUTOHACK IDLE</a:t>
-            </a:r>
-          </a:p>
-          <a:p>
-            <a:r>
-              <a:rPr lang="en-US" sz="4800" dirty="0"/>
+              <a:rPr lang="en-US" sz="4400" b="1" dirty="0"/>
+              <a:t>Hyland Tech Outreach Portal</a:t>
+            </a:r>
+          </a:p>
+          <a:p>
+            <a:r>
+              <a:rPr lang="en-US" sz="4400" dirty="0"/>
               <a:t>Expectations: </a:t>
             </a:r>
             <a:r>
-              <a:rPr lang="en-US" sz="4800" b="1" dirty="0"/>
+              <a:rPr lang="en-US" sz="4400" b="1" dirty="0"/>
               <a:t>be professional</a:t>
             </a:r>
           </a:p>
           <a:p>
             <a:r>
-              <a:rPr lang="en-US" sz="4800" dirty="0"/>
+              <a:rPr lang="en-US" sz="4400" dirty="0"/>
               <a:t>Dealing with downtime: </a:t>
             </a:r>
             <a:r>
-              <a:rPr lang="en-US" sz="4800" b="1" dirty="0"/>
+              <a:rPr lang="en-US" sz="4400" b="1" dirty="0"/>
               <a:t>fun things</a:t>
             </a:r>
           </a:p>
@@ -4311,14 +4284,14 @@
             <p:ph idx="1"/>
             <p:extLst>
               <p:ext uri="{D42A27DB-BD31-4B8C-83A1-F6EECF244321}">
-                <p14:modId xmlns:p14="http://schemas.microsoft.com/office/powerpoint/2010/main" val="2262857446"/>
+                <p14:modId xmlns:p14="http://schemas.microsoft.com/office/powerpoint/2010/main" val="1763560166"/>
               </p:ext>
             </p:extLst>
           </p:nvPr>
         </p:nvGraphicFramePr>
         <p:xfrm>
-          <a:off x="838200" y="1666240"/>
-          <a:ext cx="10515600" cy="4723764"/>
+          <a:off x="838200" y="1666239"/>
+          <a:ext cx="10515600" cy="4513845"/>
         </p:xfrm>
         <a:graphic>
           <a:graphicData uri="http://schemas.openxmlformats.org/drawingml/2006/table">
@@ -4342,7 +4315,7 @@
                   </a:extLst>
                 </a:gridCol>
               </a:tblGrid>
-              <a:tr h="787294">
+              <a:tr h="902769">
                 <a:tc>
                   <a:txBody>
                     <a:bodyPr/>
@@ -4377,7 +4350,7 @@
                   </a:ext>
                 </a:extLst>
               </a:tr>
-              <a:tr h="787294">
+              <a:tr h="902769">
                 <a:tc>
                   <a:txBody>
                     <a:bodyPr/>
@@ -4412,7 +4385,7 @@
                   </a:ext>
                 </a:extLst>
               </a:tr>
-              <a:tr h="787294">
+              <a:tr h="902769">
                 <a:tc>
                   <a:txBody>
                     <a:bodyPr/>
@@ -4435,7 +4408,7 @@
                       <a:pPr algn="ctr"/>
                       <a:r>
                         <a:rPr lang="en-US" sz="2800" dirty="0"/>
-                        <a:t>Internship Tips</a:t>
+                        <a:t>Desk Time</a:t>
                       </a:r>
                     </a:p>
                   </a:txBody>
@@ -4447,7 +4420,7 @@
                   </a:ext>
                 </a:extLst>
               </a:tr>
-              <a:tr h="787294">
+              <a:tr h="902769">
                 <a:tc>
                   <a:txBody>
                     <a:bodyPr/>
@@ -4456,42 +4429,7 @@
                       <a:pPr algn="ctr"/>
                       <a:r>
                         <a:rPr lang="en-US" sz="2800" dirty="0"/>
-                        <a:t>1:00pm-1:30pm</a:t>
-                      </a:r>
-                    </a:p>
-                  </a:txBody>
-                  <a:tcPr anchor="ctr"/>
-                </a:tc>
-                <a:tc>
-                  <a:txBody>
-                    <a:bodyPr/>
-                    <a:lstStyle/>
-                    <a:p>
-                      <a:pPr algn="ctr"/>
-                      <a:r>
-                        <a:rPr lang="en-US" sz="2800" dirty="0"/>
-                        <a:t>Desk Time</a:t>
-                      </a:r>
-                    </a:p>
-                  </a:txBody>
-                  <a:tcPr anchor="ctr"/>
-                </a:tc>
-                <a:extLst>
-                  <a:ext uri="{0D108BD9-81ED-4DB2-BD59-A6C34878D82A}">
-                    <a16:rowId xmlns:a16="http://schemas.microsoft.com/office/drawing/2014/main" val="834540423"/>
-                  </a:ext>
-                </a:extLst>
-              </a:tr>
-              <a:tr h="787294">
-                <a:tc>
-                  <a:txBody>
-                    <a:bodyPr/>
-                    <a:lstStyle/>
-                    <a:p>
-                      <a:pPr algn="ctr"/>
-                      <a:r>
-                        <a:rPr lang="en-US" sz="2800" dirty="0"/>
-                        <a:t>1:30pm-3:00pm</a:t>
+                        <a:t>1:00pm-2:00pm</a:t>
                       </a:r>
                     </a:p>
                   </a:txBody>
@@ -4513,11 +4451,11 @@
                 </a:tc>
                 <a:extLst>
                   <a:ext uri="{0D108BD9-81ED-4DB2-BD59-A6C34878D82A}">
-                    <a16:rowId xmlns:a16="http://schemas.microsoft.com/office/drawing/2014/main" val="892186844"/>
+                    <a16:rowId xmlns:a16="http://schemas.microsoft.com/office/drawing/2014/main" val="834540423"/>
                   </a:ext>
                 </a:extLst>
               </a:tr>
-              <a:tr h="787294">
+              <a:tr h="902769">
                 <a:tc>
                   <a:txBody>
                     <a:bodyPr/>
@@ -4526,7 +4464,7 @@
                       <a:pPr algn="ctr"/>
                       <a:r>
                         <a:rPr lang="en-US" sz="2800" dirty="0"/>
-                        <a:t>3:00pm-4:00pm</a:t>
+                        <a:t>2:00pm-4:00pm</a:t>
                       </a:r>
                     </a:p>
                   </a:txBody>

</xml_diff>

<commit_message>
ready for day 1
</commit_message>
<xml_diff>
--- a/MeetTeam.pptx
+++ b/MeetTeam.pptx
@@ -5,7 +5,7 @@
     <p:sldMasterId id="2147483684" r:id="rId1"/>
   </p:sldMasterIdLst>
   <p:notesMasterIdLst>
-    <p:notesMasterId r:id="rId10"/>
+    <p:notesMasterId r:id="rId12"/>
   </p:notesMasterIdLst>
   <p:sldIdLst>
     <p:sldId id="256" r:id="rId2"/>
@@ -15,19 +15,21 @@
     <p:sldId id="260" r:id="rId6"/>
     <p:sldId id="390" r:id="rId7"/>
     <p:sldId id="391" r:id="rId8"/>
-    <p:sldId id="386" r:id="rId9"/>
+    <p:sldId id="384" r:id="rId9"/>
+    <p:sldId id="393" r:id="rId10"/>
+    <p:sldId id="386" r:id="rId11"/>
   </p:sldIdLst>
   <p:sldSz cx="12192000" cy="6858000"/>
   <p:notesSz cx="6858000" cy="9144000"/>
   <p:embeddedFontLst>
     <p:embeddedFont>
       <p:font typeface="Director" pitchFamily="2" charset="0"/>
-      <p:regular r:id="rId11"/>
+      <p:regular r:id="rId13"/>
     </p:embeddedFont>
     <p:embeddedFont>
       <p:font typeface="Inter" panose="02000503000000020004" pitchFamily="2" charset="0"/>
-      <p:regular r:id="rId12"/>
-      <p:bold r:id="rId13"/>
+      <p:regular r:id="rId14"/>
+      <p:bold r:id="rId15"/>
     </p:embeddedFont>
   </p:embeddedFontLst>
   <p:defaultTextStyle>
@@ -215,7 +217,7 @@
           <a:p>
             <a:fld id="{7CF2004C-AD6B-4A9A-A490-3730F26EBC0C}" type="datetimeFigureOut">
               <a:rPr lang="en-US" smtClean="0"/>
-              <a:t>6/4/2025</a:t>
+              <a:t>6/9/2025</a:t>
             </a:fld>
             <a:endParaRPr lang="en-US"/>
           </a:p>
@@ -613,7 +615,7 @@
           <a:p>
             <a:fld id="{2E6CAD52-DA28-4E78-92DA-C35A0DBEE03A}" type="datetimeFigureOut">
               <a:rPr lang="en-US" smtClean="0"/>
-              <a:t>6/4/2025</a:t>
+              <a:t>6/9/2025</a:t>
             </a:fld>
             <a:endParaRPr lang="en-US"/>
           </a:p>
@@ -783,7 +785,7 @@
           <a:p>
             <a:fld id="{2E6CAD52-DA28-4E78-92DA-C35A0DBEE03A}" type="datetimeFigureOut">
               <a:rPr lang="en-US" smtClean="0"/>
-              <a:t>6/4/2025</a:t>
+              <a:t>6/9/2025</a:t>
             </a:fld>
             <a:endParaRPr lang="en-US"/>
           </a:p>
@@ -963,7 +965,7 @@
           <a:p>
             <a:fld id="{2E6CAD52-DA28-4E78-92DA-C35A0DBEE03A}" type="datetimeFigureOut">
               <a:rPr lang="en-US" smtClean="0"/>
-              <a:t>6/4/2025</a:t>
+              <a:t>6/9/2025</a:t>
             </a:fld>
             <a:endParaRPr lang="en-US"/>
           </a:p>
@@ -1133,7 +1135,7 @@
           <a:p>
             <a:fld id="{2E6CAD52-DA28-4E78-92DA-C35A0DBEE03A}" type="datetimeFigureOut">
               <a:rPr lang="en-US" smtClean="0"/>
-              <a:t>6/4/2025</a:t>
+              <a:t>6/9/2025</a:t>
             </a:fld>
             <a:endParaRPr lang="en-US"/>
           </a:p>
@@ -1379,7 +1381,7 @@
           <a:p>
             <a:fld id="{2E6CAD52-DA28-4E78-92DA-C35A0DBEE03A}" type="datetimeFigureOut">
               <a:rPr lang="en-US" smtClean="0"/>
-              <a:t>6/4/2025</a:t>
+              <a:t>6/9/2025</a:t>
             </a:fld>
             <a:endParaRPr lang="en-US"/>
           </a:p>
@@ -1611,7 +1613,7 @@
           <a:p>
             <a:fld id="{2E6CAD52-DA28-4E78-92DA-C35A0DBEE03A}" type="datetimeFigureOut">
               <a:rPr lang="en-US" smtClean="0"/>
-              <a:t>6/4/2025</a:t>
+              <a:t>6/9/2025</a:t>
             </a:fld>
             <a:endParaRPr lang="en-US"/>
           </a:p>
@@ -1978,7 +1980,7 @@
           <a:p>
             <a:fld id="{2E6CAD52-DA28-4E78-92DA-C35A0DBEE03A}" type="datetimeFigureOut">
               <a:rPr lang="en-US" smtClean="0"/>
-              <a:t>6/4/2025</a:t>
+              <a:t>6/9/2025</a:t>
             </a:fld>
             <a:endParaRPr lang="en-US"/>
           </a:p>
@@ -2096,7 +2098,7 @@
           <a:p>
             <a:fld id="{2E6CAD52-DA28-4E78-92DA-C35A0DBEE03A}" type="datetimeFigureOut">
               <a:rPr lang="en-US" smtClean="0"/>
-              <a:t>6/4/2025</a:t>
+              <a:t>6/9/2025</a:t>
             </a:fld>
             <a:endParaRPr lang="en-US"/>
           </a:p>
@@ -2191,7 +2193,7 @@
           <a:p>
             <a:fld id="{2E6CAD52-DA28-4E78-92DA-C35A0DBEE03A}" type="datetimeFigureOut">
               <a:rPr lang="en-US" smtClean="0"/>
-              <a:t>6/4/2025</a:t>
+              <a:t>6/9/2025</a:t>
             </a:fld>
             <a:endParaRPr lang="en-US"/>
           </a:p>
@@ -2468,7 +2470,7 @@
           <a:p>
             <a:fld id="{2E6CAD52-DA28-4E78-92DA-C35A0DBEE03A}" type="datetimeFigureOut">
               <a:rPr lang="en-US" smtClean="0"/>
-              <a:t>6/4/2025</a:t>
+              <a:t>6/9/2025</a:t>
             </a:fld>
             <a:endParaRPr lang="en-US"/>
           </a:p>
@@ -2725,7 +2727,7 @@
           <a:p>
             <a:fld id="{2E6CAD52-DA28-4E78-92DA-C35A0DBEE03A}" type="datetimeFigureOut">
               <a:rPr lang="en-US" smtClean="0"/>
-              <a:t>6/4/2025</a:t>
+              <a:t>6/9/2025</a:t>
             </a:fld>
             <a:endParaRPr lang="en-US"/>
           </a:p>
@@ -2938,7 +2940,7 @@
           <a:p>
             <a:fld id="{2E6CAD52-DA28-4E78-92DA-C35A0DBEE03A}" type="datetimeFigureOut">
               <a:rPr lang="en-US" smtClean="0"/>
-              <a:t>6/4/2025</a:t>
+              <a:t>6/9/2025</a:t>
             </a:fld>
             <a:endParaRPr lang="en-US"/>
           </a:p>
@@ -3438,6 +3440,97 @@
 </p:sld>
 </file>
 
+<file path=ppt/slides/slide10.xml><?xml version="1.0" encoding="utf-8"?>
+<p:sld xmlns:a="http://schemas.openxmlformats.org/drawingml/2006/main" xmlns:r="http://schemas.openxmlformats.org/officeDocument/2006/relationships" xmlns:p="http://schemas.openxmlformats.org/presentationml/2006/main">
+  <p:cSld>
+    <p:spTree>
+      <p:nvGrpSpPr>
+        <p:cNvPr id="1" name=""/>
+        <p:cNvGrpSpPr/>
+        <p:nvPr/>
+      </p:nvGrpSpPr>
+      <p:grpSpPr>
+        <a:xfrm>
+          <a:off x="0" y="0"/>
+          <a:ext cx="0" cy="0"/>
+          <a:chOff x="0" y="0"/>
+          <a:chExt cx="0" cy="0"/>
+        </a:xfrm>
+      </p:grpSpPr>
+      <p:sp>
+        <p:nvSpPr>
+          <p:cNvPr id="2" name="Title 1">
+            <a:extLst>
+              <a:ext uri="{FF2B5EF4-FFF2-40B4-BE49-F238E27FC236}">
+                <a16:creationId xmlns:a16="http://schemas.microsoft.com/office/drawing/2014/main" id="{01F9C0DC-B238-3823-59FF-55A5FC4212E1}"/>
+              </a:ext>
+            </a:extLst>
+          </p:cNvPr>
+          <p:cNvSpPr>
+            <a:spLocks noGrp="1"/>
+          </p:cNvSpPr>
+          <p:nvPr>
+            <p:ph type="title"/>
+          </p:nvPr>
+        </p:nvSpPr>
+        <p:spPr/>
+        <p:txBody>
+          <a:bodyPr/>
+          <a:lstStyle/>
+          <a:p>
+            <a:r>
+              <a:rPr lang="en-US" dirty="0"/>
+              <a:t>THANK YOU</a:t>
+            </a:r>
+          </a:p>
+        </p:txBody>
+      </p:sp>
+      <p:sp>
+        <p:nvSpPr>
+          <p:cNvPr id="3" name="Text Placeholder 2">
+            <a:extLst>
+              <a:ext uri="{FF2B5EF4-FFF2-40B4-BE49-F238E27FC236}">
+                <a16:creationId xmlns:a16="http://schemas.microsoft.com/office/drawing/2014/main" id="{13F25B73-B2E7-9DC4-7B36-887C5D620742}"/>
+              </a:ext>
+            </a:extLst>
+          </p:cNvPr>
+          <p:cNvSpPr>
+            <a:spLocks noGrp="1"/>
+          </p:cNvSpPr>
+          <p:nvPr>
+            <p:ph type="body" idx="1"/>
+          </p:nvPr>
+        </p:nvSpPr>
+        <p:spPr/>
+        <p:txBody>
+          <a:bodyPr/>
+          <a:lstStyle/>
+          <a:p>
+            <a:r>
+              <a:rPr lang="en-US" i="1" dirty="0"/>
+              <a:t>lunch </a:t>
+            </a:r>
+            <a:r>
+              <a:rPr lang="en-US" i="1"/>
+              <a:t>is next!</a:t>
+            </a:r>
+            <a:endParaRPr lang="en-US" i="1" dirty="0"/>
+          </a:p>
+        </p:txBody>
+      </p:sp>
+    </p:spTree>
+    <p:extLst>
+      <p:ext uri="{BB962C8B-B14F-4D97-AF65-F5344CB8AC3E}">
+        <p14:creationId xmlns:p14="http://schemas.microsoft.com/office/powerpoint/2010/main" val="271307970"/>
+      </p:ext>
+    </p:extLst>
+  </p:cSld>
+  <p:clrMapOvr>
+    <a:masterClrMapping/>
+  </p:clrMapOvr>
+</p:sld>
+</file>
+
 <file path=ppt/slides/slide2.xml><?xml version="1.0" encoding="utf-8"?>
 <p:sld xmlns:a="http://schemas.openxmlformats.org/drawingml/2006/main" xmlns:r="http://schemas.openxmlformats.org/officeDocument/2006/relationships" xmlns:p="http://schemas.openxmlformats.org/presentationml/2006/main">
   <p:cSld>
@@ -3520,7 +3613,7 @@
             </a:pPr>
             <a:r>
               <a:rPr lang="en-US" dirty="0"/>
-              <a:t>Calendar / Working Hours</a:t>
+              <a:t>Overview</a:t>
             </a:r>
           </a:p>
           <a:p>
@@ -3798,6 +3891,16 @@
             <a:r>
               <a:rPr lang="en-US" sz="4400" b="1" dirty="0"/>
               <a:t>be professional</a:t>
+            </a:r>
+          </a:p>
+          <a:p>
+            <a:r>
+              <a:rPr lang="en-US" sz="4400" dirty="0"/>
+              <a:t>Calendar: </a:t>
+            </a:r>
+            <a:r>
+              <a:rPr lang="en-US" sz="4400" b="1" dirty="0"/>
+              <a:t>check Outlook</a:t>
             </a:r>
           </a:p>
           <a:p>
@@ -4026,6 +4129,55 @@
                       </p:childTnLst>
                     </p:cTn>
                   </p:par>
+                  <p:par>
+                    <p:cTn id="19" fill="hold">
+                      <p:stCondLst>
+                        <p:cond delay="indefinite"/>
+                      </p:stCondLst>
+                      <p:childTnLst>
+                        <p:par>
+                          <p:cTn id="20" fill="hold">
+                            <p:stCondLst>
+                              <p:cond delay="0"/>
+                            </p:stCondLst>
+                            <p:childTnLst>
+                              <p:par>
+                                <p:cTn id="21" presetID="1" presetClass="entr" presetSubtype="0" fill="hold" nodeType="clickEffect">
+                                  <p:stCondLst>
+                                    <p:cond delay="0"/>
+                                  </p:stCondLst>
+                                  <p:childTnLst>
+                                    <p:set>
+                                      <p:cBhvr>
+                                        <p:cTn id="22" dur="1" fill="hold">
+                                          <p:stCondLst>
+                                            <p:cond delay="0"/>
+                                          </p:stCondLst>
+                                        </p:cTn>
+                                        <p:tgtEl>
+                                          <p:spTgt spid="3">
+                                            <p:txEl>
+                                              <p:pRg st="4" end="4"/>
+                                            </p:txEl>
+                                          </p:spTgt>
+                                        </p:tgtEl>
+                                        <p:attrNameLst>
+                                          <p:attrName>style.visibility</p:attrName>
+                                        </p:attrNameLst>
+                                      </p:cBhvr>
+                                      <p:to>
+                                        <p:strVal val="visible"/>
+                                      </p:to>
+                                    </p:set>
+                                  </p:childTnLst>
+                                </p:cTn>
+                              </p:par>
+                            </p:childTnLst>
+                          </p:cTn>
+                        </p:par>
+                      </p:childTnLst>
+                    </p:cTn>
+                  </p:par>
                 </p:childTnLst>
               </p:cTn>
               <p:prevCondLst>
@@ -4284,14 +4436,14 @@
             <p:ph idx="1"/>
             <p:extLst>
               <p:ext uri="{D42A27DB-BD31-4B8C-83A1-F6EECF244321}">
-                <p14:modId xmlns:p14="http://schemas.microsoft.com/office/powerpoint/2010/main" val="1763560166"/>
+                <p14:modId xmlns:p14="http://schemas.microsoft.com/office/powerpoint/2010/main" val="1455492509"/>
               </p:ext>
             </p:extLst>
           </p:nvPr>
         </p:nvGraphicFramePr>
         <p:xfrm>
-          <a:off x="838200" y="1666239"/>
-          <a:ext cx="10515600" cy="4513845"/>
+          <a:off x="838200" y="1690688"/>
+          <a:ext cx="10515600" cy="4329144"/>
         </p:xfrm>
         <a:graphic>
           <a:graphicData uri="http://schemas.openxmlformats.org/drawingml/2006/table">
@@ -4315,7 +4467,7 @@
                   </a:extLst>
                 </a:gridCol>
               </a:tblGrid>
-              <a:tr h="902769">
+              <a:tr h="721524">
                 <a:tc>
                   <a:txBody>
                     <a:bodyPr/>
@@ -4350,7 +4502,7 @@
                   </a:ext>
                 </a:extLst>
               </a:tr>
-              <a:tr h="902769">
+              <a:tr h="721524">
                 <a:tc>
                   <a:txBody>
                     <a:bodyPr/>
@@ -4385,7 +4537,7 @@
                   </a:ext>
                 </a:extLst>
               </a:tr>
-              <a:tr h="902769">
+              <a:tr h="721524">
                 <a:tc>
                   <a:txBody>
                     <a:bodyPr/>
@@ -4420,7 +4572,7 @@
                   </a:ext>
                 </a:extLst>
               </a:tr>
-              <a:tr h="902769">
+              <a:tr h="721524">
                 <a:tc>
                   <a:txBody>
                     <a:bodyPr/>
@@ -4455,7 +4607,7 @@
                   </a:ext>
                 </a:extLst>
               </a:tr>
-              <a:tr h="902769">
+              <a:tr h="721524">
                 <a:tc>
                   <a:txBody>
                     <a:bodyPr/>
@@ -4464,7 +4616,42 @@
                       <a:pPr algn="ctr"/>
                       <a:r>
                         <a:rPr lang="en-US" sz="2800" dirty="0"/>
-                        <a:t>2:00pm-4:00pm</a:t>
+                        <a:t>2:00pm-2:30pm</a:t>
+                      </a:r>
+                    </a:p>
+                  </a:txBody>
+                  <a:tcPr anchor="ctr"/>
+                </a:tc>
+                <a:tc>
+                  <a:txBody>
+                    <a:bodyPr/>
+                    <a:lstStyle/>
+                    <a:p>
+                      <a:pPr algn="ctr"/>
+                      <a:r>
+                        <a:rPr lang="en-US" sz="2800" dirty="0"/>
+                        <a:t>Tech Outreach Team Meeting</a:t>
+                      </a:r>
+                    </a:p>
+                  </a:txBody>
+                  <a:tcPr anchor="ctr"/>
+                </a:tc>
+                <a:extLst>
+                  <a:ext uri="{0D108BD9-81ED-4DB2-BD59-A6C34878D82A}">
+                    <a16:rowId xmlns:a16="http://schemas.microsoft.com/office/drawing/2014/main" val="2971069475"/>
+                  </a:ext>
+                </a:extLst>
+              </a:tr>
+              <a:tr h="721524">
+                <a:tc>
+                  <a:txBody>
+                    <a:bodyPr/>
+                    <a:lstStyle/>
+                    <a:p>
+                      <a:pPr algn="ctr"/>
+                      <a:r>
+                        <a:rPr lang="en-US" sz="2800" dirty="0"/>
+                        <a:t>2:30pm-4:00pm</a:t>
                       </a:r>
                     </a:p>
                   </a:txBody>
@@ -4486,7 +4673,7 @@
                 </a:tc>
                 <a:extLst>
                   <a:ext uri="{0D108BD9-81ED-4DB2-BD59-A6C34878D82A}">
-                    <a16:rowId xmlns:a16="http://schemas.microsoft.com/office/drawing/2014/main" val="2971069475"/>
+                    <a16:rowId xmlns:a16="http://schemas.microsoft.com/office/drawing/2014/main" val="2648002610"/>
                   </a:ext>
                 </a:extLst>
               </a:tr>
@@ -4529,7 +4716,7 @@
           <p:cNvPr id="2" name="Title 1">
             <a:extLst>
               <a:ext uri="{FF2B5EF4-FFF2-40B4-BE49-F238E27FC236}">
-                <a16:creationId xmlns:a16="http://schemas.microsoft.com/office/drawing/2014/main" id="{01F9C0DC-B238-3823-59FF-55A5FC4212E1}"/>
+                <a16:creationId xmlns:a16="http://schemas.microsoft.com/office/drawing/2014/main" id="{FF843D9E-7C2E-489A-A90C-948A9ED5E242}"/>
               </a:ext>
             </a:extLst>
           </p:cNvPr>
@@ -4542,12 +4729,14 @@
         </p:nvSpPr>
         <p:spPr/>
         <p:txBody>
-          <a:bodyPr/>
-          <a:lstStyle/>
-          <a:p>
-            <a:r>
-              <a:rPr lang="en-US" dirty="0"/>
-              <a:t>THANK YOU</a:t>
+          <a:bodyPr>
+            <a:normAutofit/>
+          </a:bodyPr>
+          <a:lstStyle/>
+          <a:p>
+            <a:r>
+              <a:rPr lang="en-US" sz="5400" dirty="0"/>
+              <a:t>First Week Checklist</a:t>
             </a:r>
           </a:p>
         </p:txBody>
@@ -4557,7 +4746,7 @@
           <p:cNvPr id="3" name="Text Placeholder 2">
             <a:extLst>
               <a:ext uri="{FF2B5EF4-FFF2-40B4-BE49-F238E27FC236}">
-                <a16:creationId xmlns:a16="http://schemas.microsoft.com/office/drawing/2014/main" id="{13F25B73-B2E7-9DC4-7B36-887C5D620742}"/>
+                <a16:creationId xmlns:a16="http://schemas.microsoft.com/office/drawing/2014/main" id="{03ADFC6A-6F87-9200-21AC-FE0965ED13DA}"/>
               </a:ext>
             </a:extLst>
           </p:cNvPr>
@@ -4574,21 +4763,652 @@
           <a:lstStyle/>
           <a:p>
             <a:r>
+              <a:rPr lang="en-US" i="1" dirty="0" err="1"/>
+              <a:t>gotta</a:t>
+            </a:r>
+            <a:r>
               <a:rPr lang="en-US" i="1" dirty="0"/>
-              <a:t>lunch </a:t>
-            </a:r>
-            <a:r>
-              <a:rPr lang="en-US" i="1"/>
-              <a:t>is next!</a:t>
-            </a:r>
-            <a:endParaRPr lang="en-US" i="1" dirty="0"/>
+              <a:t> check ‘</a:t>
+            </a:r>
+            <a:r>
+              <a:rPr lang="en-US" i="1" dirty="0" err="1"/>
+              <a:t>em</a:t>
+            </a:r>
+            <a:r>
+              <a:rPr lang="en-US" i="1" dirty="0"/>
+              <a:t> all!</a:t>
+            </a:r>
           </a:p>
         </p:txBody>
       </p:sp>
     </p:spTree>
     <p:extLst>
       <p:ext uri="{BB962C8B-B14F-4D97-AF65-F5344CB8AC3E}">
-        <p14:creationId xmlns:p14="http://schemas.microsoft.com/office/powerpoint/2010/main" val="271307970"/>
+        <p14:creationId xmlns:p14="http://schemas.microsoft.com/office/powerpoint/2010/main" val="965477525"/>
+      </p:ext>
+    </p:extLst>
+  </p:cSld>
+  <p:clrMapOvr>
+    <a:masterClrMapping/>
+  </p:clrMapOvr>
+</p:sld>
+</file>
+
+<file path=ppt/slides/slide9.xml><?xml version="1.0" encoding="utf-8"?>
+<p:sld xmlns:a="http://schemas.openxmlformats.org/drawingml/2006/main" xmlns:r="http://schemas.openxmlformats.org/officeDocument/2006/relationships" xmlns:p="http://schemas.openxmlformats.org/presentationml/2006/main">
+  <p:cSld>
+    <p:spTree>
+      <p:nvGrpSpPr>
+        <p:cNvPr id="1" name=""/>
+        <p:cNvGrpSpPr/>
+        <p:nvPr/>
+      </p:nvGrpSpPr>
+      <p:grpSpPr>
+        <a:xfrm>
+          <a:off x="0" y="0"/>
+          <a:ext cx="0" cy="0"/>
+          <a:chOff x="0" y="0"/>
+          <a:chExt cx="0" cy="0"/>
+        </a:xfrm>
+      </p:grpSpPr>
+      <p:sp>
+        <p:nvSpPr>
+          <p:cNvPr id="3" name="TextBox 2">
+            <a:extLst>
+              <a:ext uri="{FF2B5EF4-FFF2-40B4-BE49-F238E27FC236}">
+                <a16:creationId xmlns:a16="http://schemas.microsoft.com/office/drawing/2014/main" id="{4DD078B1-774A-E2CA-DDD3-924CFDB12040}"/>
+              </a:ext>
+            </a:extLst>
+          </p:cNvPr>
+          <p:cNvSpPr txBox="1"/>
+          <p:nvPr/>
+        </p:nvSpPr>
+        <p:spPr>
+          <a:xfrm>
+            <a:off x="426720" y="1762805"/>
+            <a:ext cx="5303520" cy="3332387"/>
+          </a:xfrm>
+          <a:prstGeom prst="rect">
+            <a:avLst/>
+          </a:prstGeom>
+          <a:noFill/>
+        </p:spPr>
+        <p:txBody>
+          <a:bodyPr wrap="square">
+            <a:spAutoFit/>
+          </a:bodyPr>
+          <a:lstStyle/>
+          <a:p>
+            <a:pPr marL="342900" marR="0" lvl="0" indent="-342900">
+              <a:lnSpc>
+                <a:spcPts val="3200"/>
+              </a:lnSpc>
+              <a:spcBef>
+                <a:spcPts val="0"/>
+              </a:spcBef>
+              <a:spcAft>
+                <a:spcPts val="0"/>
+              </a:spcAft>
+              <a:buFont typeface="Wingdings" panose="05000000000000000000" pitchFamily="2" charset="2"/>
+              <a:buChar char=""/>
+            </a:pPr>
+            <a:r>
+              <a:rPr lang="en-US" sz="1800" dirty="0">
+                <a:effectLst/>
+                <a:latin typeface="Inter" panose="02000503000000020004" pitchFamily="2" charset="0"/>
+                <a:ea typeface="Calibri" panose="020F0502020204030204" pitchFamily="34" charset="0"/>
+                <a:cs typeface="Times New Roman" panose="02020603050405020304" pitchFamily="18" charset="0"/>
+              </a:rPr>
+              <a:t>Visit the internship homepage</a:t>
+            </a:r>
+            <a:endParaRPr lang="en-US" sz="1400" dirty="0">
+              <a:effectLst/>
+              <a:latin typeface="Calibri" panose="020F0502020204030204" pitchFamily="34" charset="0"/>
+              <a:ea typeface="Calibri" panose="020F0502020204030204" pitchFamily="34" charset="0"/>
+              <a:cs typeface="Times New Roman" panose="02020603050405020304" pitchFamily="18" charset="0"/>
+            </a:endParaRPr>
+          </a:p>
+          <a:p>
+            <a:pPr marL="342900" marR="0" lvl="0" indent="-342900">
+              <a:lnSpc>
+                <a:spcPts val="3200"/>
+              </a:lnSpc>
+              <a:spcBef>
+                <a:spcPts val="0"/>
+              </a:spcBef>
+              <a:spcAft>
+                <a:spcPts val="0"/>
+              </a:spcAft>
+              <a:buFont typeface="Wingdings" panose="05000000000000000000" pitchFamily="2" charset="2"/>
+              <a:buChar char=""/>
+            </a:pPr>
+            <a:r>
+              <a:rPr lang="en-US" sz="1800" dirty="0">
+                <a:effectLst/>
+                <a:latin typeface="Inter" panose="02000503000000020004" pitchFamily="2" charset="0"/>
+                <a:ea typeface="Calibri" panose="020F0502020204030204" pitchFamily="34" charset="0"/>
+                <a:cs typeface="Times New Roman" panose="02020603050405020304" pitchFamily="18" charset="0"/>
+              </a:rPr>
+              <a:t>Change your desktop background</a:t>
+            </a:r>
+            <a:endParaRPr lang="en-US" sz="1400" dirty="0">
+              <a:effectLst/>
+              <a:latin typeface="Calibri" panose="020F0502020204030204" pitchFamily="34" charset="0"/>
+              <a:ea typeface="Calibri" panose="020F0502020204030204" pitchFamily="34" charset="0"/>
+              <a:cs typeface="Times New Roman" panose="02020603050405020304" pitchFamily="18" charset="0"/>
+            </a:endParaRPr>
+          </a:p>
+          <a:p>
+            <a:pPr marL="342900" marR="0" lvl="0" indent="-342900">
+              <a:lnSpc>
+                <a:spcPts val="3200"/>
+              </a:lnSpc>
+              <a:spcBef>
+                <a:spcPts val="0"/>
+              </a:spcBef>
+              <a:spcAft>
+                <a:spcPts val="0"/>
+              </a:spcAft>
+              <a:buFont typeface="Wingdings" panose="05000000000000000000" pitchFamily="2" charset="2"/>
+              <a:buChar char=""/>
+            </a:pPr>
+            <a:r>
+              <a:rPr lang="en-US" sz="1800" dirty="0">
+                <a:effectLst/>
+                <a:latin typeface="Inter" panose="02000503000000020004" pitchFamily="2" charset="0"/>
+                <a:ea typeface="Calibri" panose="020F0502020204030204" pitchFamily="34" charset="0"/>
+                <a:cs typeface="Times New Roman" panose="02020603050405020304" pitchFamily="18" charset="0"/>
+              </a:rPr>
+              <a:t>Play a game of ping pong</a:t>
+            </a:r>
+            <a:endParaRPr lang="en-US" sz="1400" dirty="0">
+              <a:effectLst/>
+              <a:latin typeface="Calibri" panose="020F0502020204030204" pitchFamily="34" charset="0"/>
+              <a:ea typeface="Calibri" panose="020F0502020204030204" pitchFamily="34" charset="0"/>
+              <a:cs typeface="Times New Roman" panose="02020603050405020304" pitchFamily="18" charset="0"/>
+            </a:endParaRPr>
+          </a:p>
+          <a:p>
+            <a:pPr marL="342900" marR="0" lvl="0" indent="-342900">
+              <a:lnSpc>
+                <a:spcPts val="3200"/>
+              </a:lnSpc>
+              <a:spcBef>
+                <a:spcPts val="0"/>
+              </a:spcBef>
+              <a:spcAft>
+                <a:spcPts val="0"/>
+              </a:spcAft>
+              <a:buFont typeface="Wingdings" panose="05000000000000000000" pitchFamily="2" charset="2"/>
+              <a:buChar char=""/>
+            </a:pPr>
+            <a:r>
+              <a:rPr lang="en-US" sz="1800" dirty="0">
+                <a:effectLst/>
+                <a:latin typeface="Inter" panose="02000503000000020004" pitchFamily="2" charset="0"/>
+                <a:ea typeface="Calibri" panose="020F0502020204030204" pitchFamily="34" charset="0"/>
+                <a:cs typeface="Times New Roman" panose="02020603050405020304" pitchFamily="18" charset="0"/>
+              </a:rPr>
+              <a:t>Watch a video from the Fun Things page</a:t>
+            </a:r>
+            <a:endParaRPr lang="en-US" sz="1400" dirty="0">
+              <a:effectLst/>
+              <a:latin typeface="Calibri" panose="020F0502020204030204" pitchFamily="34" charset="0"/>
+              <a:ea typeface="Calibri" panose="020F0502020204030204" pitchFamily="34" charset="0"/>
+              <a:cs typeface="Times New Roman" panose="02020603050405020304" pitchFamily="18" charset="0"/>
+            </a:endParaRPr>
+          </a:p>
+          <a:p>
+            <a:pPr marL="342900" marR="0" lvl="0" indent="-342900">
+              <a:lnSpc>
+                <a:spcPts val="3200"/>
+              </a:lnSpc>
+              <a:spcBef>
+                <a:spcPts val="0"/>
+              </a:spcBef>
+              <a:spcAft>
+                <a:spcPts val="0"/>
+              </a:spcAft>
+              <a:buFont typeface="Wingdings" panose="05000000000000000000" pitchFamily="2" charset="2"/>
+              <a:buChar char=""/>
+            </a:pPr>
+            <a:r>
+              <a:rPr lang="en-US" sz="1800" dirty="0">
+                <a:effectLst/>
+                <a:latin typeface="Inter" panose="02000503000000020004" pitchFamily="2" charset="0"/>
+                <a:ea typeface="Calibri" panose="020F0502020204030204" pitchFamily="34" charset="0"/>
+                <a:cs typeface="Times New Roman" panose="02020603050405020304" pitchFamily="18" charset="0"/>
+              </a:rPr>
+              <a:t>Complete one of the learning path items</a:t>
+            </a:r>
+            <a:endParaRPr lang="en-US" sz="1400" dirty="0">
+              <a:effectLst/>
+              <a:latin typeface="Calibri" panose="020F0502020204030204" pitchFamily="34" charset="0"/>
+              <a:ea typeface="Calibri" panose="020F0502020204030204" pitchFamily="34" charset="0"/>
+              <a:cs typeface="Times New Roman" panose="02020603050405020304" pitchFamily="18" charset="0"/>
+            </a:endParaRPr>
+          </a:p>
+          <a:p>
+            <a:pPr marL="342900" marR="0" lvl="0" indent="-342900">
+              <a:lnSpc>
+                <a:spcPts val="3200"/>
+              </a:lnSpc>
+              <a:spcBef>
+                <a:spcPts val="0"/>
+              </a:spcBef>
+              <a:spcAft>
+                <a:spcPts val="0"/>
+              </a:spcAft>
+              <a:buFont typeface="Wingdings" panose="05000000000000000000" pitchFamily="2" charset="2"/>
+              <a:buChar char=""/>
+            </a:pPr>
+            <a:r>
+              <a:rPr lang="en-US" sz="1800" dirty="0">
+                <a:effectLst/>
+                <a:latin typeface="Inter" panose="02000503000000020004" pitchFamily="2" charset="0"/>
+                <a:ea typeface="Calibri" panose="020F0502020204030204" pitchFamily="34" charset="0"/>
+                <a:cs typeface="Times New Roman" panose="02020603050405020304" pitchFamily="18" charset="0"/>
+              </a:rPr>
+              <a:t>Work somewhere other than your desk</a:t>
+            </a:r>
+            <a:endParaRPr lang="en-US" sz="1400" dirty="0">
+              <a:effectLst/>
+              <a:latin typeface="Calibri" panose="020F0502020204030204" pitchFamily="34" charset="0"/>
+              <a:ea typeface="Calibri" panose="020F0502020204030204" pitchFamily="34" charset="0"/>
+              <a:cs typeface="Times New Roman" panose="02020603050405020304" pitchFamily="18" charset="0"/>
+            </a:endParaRPr>
+          </a:p>
+          <a:p>
+            <a:pPr marL="342900" marR="0" lvl="0" indent="-342900">
+              <a:lnSpc>
+                <a:spcPts val="3200"/>
+              </a:lnSpc>
+              <a:spcBef>
+                <a:spcPts val="0"/>
+              </a:spcBef>
+              <a:spcAft>
+                <a:spcPts val="0"/>
+              </a:spcAft>
+              <a:buFont typeface="Wingdings" panose="05000000000000000000" pitchFamily="2" charset="2"/>
+              <a:buChar char=""/>
+            </a:pPr>
+            <a:r>
+              <a:rPr lang="en-US" sz="1800" dirty="0">
+                <a:effectLst/>
+                <a:latin typeface="Inter" panose="02000503000000020004" pitchFamily="2" charset="0"/>
+                <a:ea typeface="Calibri" panose="020F0502020204030204" pitchFamily="34" charset="0"/>
+                <a:cs typeface="Times New Roman" panose="02020603050405020304" pitchFamily="18" charset="0"/>
+              </a:rPr>
+              <a:t>Send an email from your work account</a:t>
+            </a:r>
+            <a:endParaRPr lang="en-US" sz="1400" dirty="0">
+              <a:effectLst/>
+              <a:latin typeface="Calibri" panose="020F0502020204030204" pitchFamily="34" charset="0"/>
+              <a:ea typeface="Calibri" panose="020F0502020204030204" pitchFamily="34" charset="0"/>
+              <a:cs typeface="Times New Roman" panose="02020603050405020304" pitchFamily="18" charset="0"/>
+            </a:endParaRPr>
+          </a:p>
+          <a:p>
+            <a:pPr marL="342900" marR="0" lvl="0" indent="-342900">
+              <a:lnSpc>
+                <a:spcPts val="3200"/>
+              </a:lnSpc>
+              <a:spcBef>
+                <a:spcPts val="0"/>
+              </a:spcBef>
+              <a:spcAft>
+                <a:spcPts val="0"/>
+              </a:spcAft>
+              <a:buFont typeface="Wingdings" panose="05000000000000000000" pitchFamily="2" charset="2"/>
+              <a:buChar char=""/>
+            </a:pPr>
+            <a:r>
+              <a:rPr lang="en-US" sz="1800" dirty="0">
+                <a:effectLst/>
+                <a:latin typeface="Inter" panose="02000503000000020004" pitchFamily="2" charset="0"/>
+                <a:ea typeface="Calibri" panose="020F0502020204030204" pitchFamily="34" charset="0"/>
+                <a:cs typeface="Times New Roman" panose="02020603050405020304" pitchFamily="18" charset="0"/>
+              </a:rPr>
+              <a:t>Run the </a:t>
+            </a:r>
+            <a:r>
+              <a:rPr lang="en-US" sz="1800" dirty="0" err="1">
+                <a:effectLst/>
+                <a:latin typeface="Inter" panose="02000503000000020004" pitchFamily="2" charset="0"/>
+                <a:ea typeface="Calibri" panose="020F0502020204030204" pitchFamily="34" charset="0"/>
+                <a:cs typeface="Times New Roman" panose="02020603050405020304" pitchFamily="18" charset="0"/>
+              </a:rPr>
+              <a:t>HyTOP</a:t>
+            </a:r>
+            <a:r>
+              <a:rPr lang="en-US" sz="1800" dirty="0">
+                <a:effectLst/>
+                <a:latin typeface="Inter" panose="02000503000000020004" pitchFamily="2" charset="0"/>
+                <a:ea typeface="Calibri" panose="020F0502020204030204" pitchFamily="34" charset="0"/>
+                <a:cs typeface="Times New Roman" panose="02020603050405020304" pitchFamily="18" charset="0"/>
+              </a:rPr>
+              <a:t> application locally</a:t>
+            </a:r>
+            <a:endParaRPr lang="en-US" sz="1400" dirty="0">
+              <a:effectLst/>
+              <a:latin typeface="Calibri" panose="020F0502020204030204" pitchFamily="34" charset="0"/>
+              <a:ea typeface="Calibri" panose="020F0502020204030204" pitchFamily="34" charset="0"/>
+              <a:cs typeface="Times New Roman" panose="02020603050405020304" pitchFamily="18" charset="0"/>
+            </a:endParaRPr>
+          </a:p>
+        </p:txBody>
+      </p:sp>
+      <p:sp>
+        <p:nvSpPr>
+          <p:cNvPr id="7" name="TextBox 6">
+            <a:extLst>
+              <a:ext uri="{FF2B5EF4-FFF2-40B4-BE49-F238E27FC236}">
+                <a16:creationId xmlns:a16="http://schemas.microsoft.com/office/drawing/2014/main" id="{BAF0AA05-6D55-8E35-1081-11689BC6B6D3}"/>
+              </a:ext>
+            </a:extLst>
+          </p:cNvPr>
+          <p:cNvSpPr txBox="1"/>
+          <p:nvPr/>
+        </p:nvSpPr>
+        <p:spPr>
+          <a:xfrm>
+            <a:off x="5730240" y="1557621"/>
+            <a:ext cx="6461760" cy="3742756"/>
+          </a:xfrm>
+          <a:prstGeom prst="rect">
+            <a:avLst/>
+          </a:prstGeom>
+          <a:noFill/>
+        </p:spPr>
+        <p:txBody>
+          <a:bodyPr wrap="square">
+            <a:spAutoFit/>
+          </a:bodyPr>
+          <a:lstStyle/>
+          <a:p>
+            <a:pPr marL="342900" marR="0" lvl="0" indent="-342900">
+              <a:lnSpc>
+                <a:spcPts val="3200"/>
+              </a:lnSpc>
+              <a:spcBef>
+                <a:spcPts val="0"/>
+              </a:spcBef>
+              <a:spcAft>
+                <a:spcPts val="0"/>
+              </a:spcAft>
+              <a:buFont typeface="Wingdings" panose="05000000000000000000" pitchFamily="2" charset="2"/>
+              <a:buChar char=""/>
+            </a:pPr>
+            <a:r>
+              <a:rPr lang="en-US" sz="1800" dirty="0">
+                <a:effectLst/>
+                <a:latin typeface="Inter" panose="02000503000000020004" pitchFamily="2" charset="0"/>
+                <a:ea typeface="Calibri" panose="020F0502020204030204" pitchFamily="34" charset="0"/>
+                <a:cs typeface="Times New Roman" panose="02020603050405020304" pitchFamily="18" charset="0"/>
+              </a:rPr>
+              <a:t>Practice pair programming</a:t>
+            </a:r>
+            <a:endParaRPr lang="en-US" sz="1400" dirty="0">
+              <a:effectLst/>
+              <a:latin typeface="Calibri" panose="020F0502020204030204" pitchFamily="34" charset="0"/>
+              <a:ea typeface="Calibri" panose="020F0502020204030204" pitchFamily="34" charset="0"/>
+              <a:cs typeface="Times New Roman" panose="02020603050405020304" pitchFamily="18" charset="0"/>
+            </a:endParaRPr>
+          </a:p>
+          <a:p>
+            <a:pPr marL="342900" marR="0" lvl="0" indent="-342900">
+              <a:lnSpc>
+                <a:spcPts val="3200"/>
+              </a:lnSpc>
+              <a:spcBef>
+                <a:spcPts val="0"/>
+              </a:spcBef>
+              <a:spcAft>
+                <a:spcPts val="0"/>
+              </a:spcAft>
+              <a:buFont typeface="Wingdings" panose="05000000000000000000" pitchFamily="2" charset="2"/>
+              <a:buChar char=""/>
+            </a:pPr>
+            <a:r>
+              <a:rPr lang="en-US" sz="1800" dirty="0">
+                <a:effectLst/>
+                <a:latin typeface="Inter" panose="02000503000000020004" pitchFamily="2" charset="0"/>
+                <a:ea typeface="Calibri" panose="020F0502020204030204" pitchFamily="34" charset="0"/>
+                <a:cs typeface="Times New Roman" panose="02020603050405020304" pitchFamily="18" charset="0"/>
+              </a:rPr>
+              <a:t>Grab some pretzels, M&amp;Ms, or mints</a:t>
+            </a:r>
+            <a:endParaRPr lang="en-US" sz="1400" dirty="0">
+              <a:effectLst/>
+              <a:latin typeface="Calibri" panose="020F0502020204030204" pitchFamily="34" charset="0"/>
+              <a:ea typeface="Calibri" panose="020F0502020204030204" pitchFamily="34" charset="0"/>
+              <a:cs typeface="Times New Roman" panose="02020603050405020304" pitchFamily="18" charset="0"/>
+            </a:endParaRPr>
+          </a:p>
+          <a:p>
+            <a:pPr marL="342900" marR="0" lvl="0" indent="-342900">
+              <a:lnSpc>
+                <a:spcPts val="3200"/>
+              </a:lnSpc>
+              <a:spcBef>
+                <a:spcPts val="0"/>
+              </a:spcBef>
+              <a:spcAft>
+                <a:spcPts val="0"/>
+              </a:spcAft>
+              <a:buFont typeface="Wingdings" panose="05000000000000000000" pitchFamily="2" charset="2"/>
+              <a:buChar char=""/>
+            </a:pPr>
+            <a:r>
+              <a:rPr lang="en-US" sz="1800" dirty="0">
+                <a:effectLst/>
+                <a:latin typeface="Inter" panose="02000503000000020004" pitchFamily="2" charset="0"/>
+                <a:ea typeface="Calibri" panose="020F0502020204030204" pitchFamily="34" charset="0"/>
+                <a:cs typeface="Times New Roman" panose="02020603050405020304" pitchFamily="18" charset="0"/>
+              </a:rPr>
+              <a:t>Send a Teams message to another intern</a:t>
+            </a:r>
+            <a:endParaRPr lang="en-US" sz="1400" dirty="0">
+              <a:effectLst/>
+              <a:latin typeface="Calibri" panose="020F0502020204030204" pitchFamily="34" charset="0"/>
+              <a:ea typeface="Calibri" panose="020F0502020204030204" pitchFamily="34" charset="0"/>
+              <a:cs typeface="Times New Roman" panose="02020603050405020304" pitchFamily="18" charset="0"/>
+            </a:endParaRPr>
+          </a:p>
+          <a:p>
+            <a:pPr marL="342900" marR="0" lvl="0" indent="-342900">
+              <a:lnSpc>
+                <a:spcPts val="3200"/>
+              </a:lnSpc>
+              <a:spcBef>
+                <a:spcPts val="0"/>
+              </a:spcBef>
+              <a:spcAft>
+                <a:spcPts val="0"/>
+              </a:spcAft>
+              <a:buFont typeface="Wingdings" panose="05000000000000000000" pitchFamily="2" charset="2"/>
+              <a:buChar char=""/>
+            </a:pPr>
+            <a:r>
+              <a:rPr lang="en-US" sz="1800" dirty="0">
+                <a:effectLst/>
+                <a:latin typeface="Inter" panose="02000503000000020004" pitchFamily="2" charset="0"/>
+                <a:ea typeface="Calibri" panose="020F0502020204030204" pitchFamily="34" charset="0"/>
+                <a:cs typeface="Times New Roman" panose="02020603050405020304" pitchFamily="18" charset="0"/>
+              </a:rPr>
+              <a:t>Run into a problem</a:t>
+            </a:r>
+            <a:endParaRPr lang="en-US" sz="1400" dirty="0">
+              <a:effectLst/>
+              <a:latin typeface="Calibri" panose="020F0502020204030204" pitchFamily="34" charset="0"/>
+              <a:ea typeface="Calibri" panose="020F0502020204030204" pitchFamily="34" charset="0"/>
+              <a:cs typeface="Times New Roman" panose="02020603050405020304" pitchFamily="18" charset="0"/>
+            </a:endParaRPr>
+          </a:p>
+          <a:p>
+            <a:pPr marL="342900" marR="0" lvl="0" indent="-342900">
+              <a:lnSpc>
+                <a:spcPts val="3200"/>
+              </a:lnSpc>
+              <a:spcBef>
+                <a:spcPts val="0"/>
+              </a:spcBef>
+              <a:spcAft>
+                <a:spcPts val="0"/>
+              </a:spcAft>
+              <a:buFont typeface="Wingdings" panose="05000000000000000000" pitchFamily="2" charset="2"/>
+              <a:buChar char=""/>
+            </a:pPr>
+            <a:r>
+              <a:rPr lang="en-US" sz="1800" dirty="0">
+                <a:effectLst/>
+                <a:latin typeface="Inter" panose="02000503000000020004" pitchFamily="2" charset="0"/>
+                <a:ea typeface="Calibri" panose="020F0502020204030204" pitchFamily="34" charset="0"/>
+                <a:cs typeface="Times New Roman" panose="02020603050405020304" pitchFamily="18" charset="0"/>
+              </a:rPr>
+              <a:t>Adorn your desk with a decorative item of some kind</a:t>
+            </a:r>
+            <a:endParaRPr lang="en-US" sz="1400" dirty="0">
+              <a:effectLst/>
+              <a:latin typeface="Calibri" panose="020F0502020204030204" pitchFamily="34" charset="0"/>
+              <a:ea typeface="Calibri" panose="020F0502020204030204" pitchFamily="34" charset="0"/>
+              <a:cs typeface="Times New Roman" panose="02020603050405020304" pitchFamily="18" charset="0"/>
+            </a:endParaRPr>
+          </a:p>
+          <a:p>
+            <a:pPr marL="342900" marR="0" lvl="0" indent="-342900">
+              <a:lnSpc>
+                <a:spcPts val="3200"/>
+              </a:lnSpc>
+              <a:spcBef>
+                <a:spcPts val="0"/>
+              </a:spcBef>
+              <a:spcAft>
+                <a:spcPts val="0"/>
+              </a:spcAft>
+              <a:buFont typeface="Wingdings" panose="05000000000000000000" pitchFamily="2" charset="2"/>
+              <a:buChar char=""/>
+            </a:pPr>
+            <a:r>
+              <a:rPr lang="en-US" sz="1800" dirty="0">
+                <a:effectLst/>
+                <a:latin typeface="Inter" panose="02000503000000020004" pitchFamily="2" charset="0"/>
+                <a:ea typeface="Calibri" panose="020F0502020204030204" pitchFamily="34" charset="0"/>
+                <a:cs typeface="Times New Roman" panose="02020603050405020304" pitchFamily="18" charset="0"/>
+              </a:rPr>
+              <a:t>Hack the password protected page</a:t>
+            </a:r>
+            <a:endParaRPr lang="en-US" sz="1400" dirty="0">
+              <a:effectLst/>
+              <a:latin typeface="Calibri" panose="020F0502020204030204" pitchFamily="34" charset="0"/>
+              <a:ea typeface="Calibri" panose="020F0502020204030204" pitchFamily="34" charset="0"/>
+              <a:cs typeface="Times New Roman" panose="02020603050405020304" pitchFamily="18" charset="0"/>
+            </a:endParaRPr>
+          </a:p>
+          <a:p>
+            <a:pPr marL="342900" marR="0" lvl="0" indent="-342900">
+              <a:lnSpc>
+                <a:spcPts val="3200"/>
+              </a:lnSpc>
+              <a:spcBef>
+                <a:spcPts val="0"/>
+              </a:spcBef>
+              <a:spcAft>
+                <a:spcPts val="0"/>
+              </a:spcAft>
+              <a:buFont typeface="Wingdings" panose="05000000000000000000" pitchFamily="2" charset="2"/>
+              <a:buChar char=""/>
+            </a:pPr>
+            <a:r>
+              <a:rPr lang="en-US" sz="1800" dirty="0">
+                <a:effectLst/>
+                <a:latin typeface="Inter" panose="02000503000000020004" pitchFamily="2" charset="0"/>
+                <a:ea typeface="Calibri" panose="020F0502020204030204" pitchFamily="34" charset="0"/>
+                <a:cs typeface="Times New Roman" panose="02020603050405020304" pitchFamily="18" charset="0"/>
+              </a:rPr>
+              <a:t>Practice mob programming</a:t>
+            </a:r>
+            <a:endParaRPr lang="en-US" sz="1400" dirty="0">
+              <a:effectLst/>
+              <a:latin typeface="Calibri" panose="020F0502020204030204" pitchFamily="34" charset="0"/>
+              <a:ea typeface="Calibri" panose="020F0502020204030204" pitchFamily="34" charset="0"/>
+              <a:cs typeface="Times New Roman" panose="02020603050405020304" pitchFamily="18" charset="0"/>
+            </a:endParaRPr>
+          </a:p>
+          <a:p>
+            <a:pPr marL="342900" marR="0" lvl="0" indent="-342900">
+              <a:lnSpc>
+                <a:spcPts val="3200"/>
+              </a:lnSpc>
+              <a:spcBef>
+                <a:spcPts val="0"/>
+              </a:spcBef>
+              <a:spcAft>
+                <a:spcPts val="0"/>
+              </a:spcAft>
+              <a:buFont typeface="Wingdings" panose="05000000000000000000" pitchFamily="2" charset="2"/>
+              <a:buChar char=""/>
+            </a:pPr>
+            <a:r>
+              <a:rPr lang="en-US" sz="1800" dirty="0">
+                <a:effectLst/>
+                <a:latin typeface="Inter" panose="02000503000000020004" pitchFamily="2" charset="0"/>
+                <a:ea typeface="Calibri" panose="020F0502020204030204" pitchFamily="34" charset="0"/>
+                <a:cs typeface="Times New Roman" panose="02020603050405020304" pitchFamily="18" charset="0"/>
+              </a:rPr>
+              <a:t>Get free </a:t>
+            </a:r>
+            <a:r>
+              <a:rPr lang="en-US" dirty="0">
+                <a:latin typeface="Inter" panose="02000503000000020004" pitchFamily="2" charset="0"/>
+                <a:ea typeface="Calibri" panose="020F0502020204030204" pitchFamily="34" charset="0"/>
+                <a:cs typeface="Times New Roman" panose="02020603050405020304" pitchFamily="18" charset="0"/>
+              </a:rPr>
+              <a:t>lunch</a:t>
+            </a:r>
+            <a:endParaRPr lang="en-US" sz="1400" dirty="0">
+              <a:effectLst/>
+              <a:latin typeface="Calibri" panose="020F0502020204030204" pitchFamily="34" charset="0"/>
+              <a:ea typeface="Calibri" panose="020F0502020204030204" pitchFamily="34" charset="0"/>
+              <a:cs typeface="Times New Roman" panose="02020603050405020304" pitchFamily="18" charset="0"/>
+            </a:endParaRPr>
+          </a:p>
+          <a:p>
+            <a:pPr marL="342900" marR="0" lvl="0" indent="-342900">
+              <a:lnSpc>
+                <a:spcPts val="3200"/>
+              </a:lnSpc>
+              <a:spcBef>
+                <a:spcPts val="0"/>
+              </a:spcBef>
+              <a:spcAft>
+                <a:spcPts val="800"/>
+              </a:spcAft>
+              <a:buFont typeface="Wingdings" panose="05000000000000000000" pitchFamily="2" charset="2"/>
+              <a:buChar char=""/>
+            </a:pPr>
+            <a:r>
+              <a:rPr lang="en-US" sz="1800" dirty="0">
+                <a:effectLst/>
+                <a:latin typeface="Inter" panose="02000503000000020004" pitchFamily="2" charset="0"/>
+                <a:ea typeface="Calibri" panose="020F0502020204030204" pitchFamily="34" charset="0"/>
+                <a:cs typeface="Times New Roman" panose="02020603050405020304" pitchFamily="18" charset="0"/>
+              </a:rPr>
+              <a:t>Successfully submit one Pull Request</a:t>
+            </a:r>
+            <a:endParaRPr lang="en-US" sz="1400" dirty="0">
+              <a:effectLst/>
+              <a:latin typeface="Calibri" panose="020F0502020204030204" pitchFamily="34" charset="0"/>
+              <a:ea typeface="Calibri" panose="020F0502020204030204" pitchFamily="34" charset="0"/>
+              <a:cs typeface="Times New Roman" panose="02020603050405020304" pitchFamily="18" charset="0"/>
+            </a:endParaRPr>
+          </a:p>
+        </p:txBody>
+      </p:sp>
+    </p:spTree>
+    <p:extLst>
+      <p:ext uri="{BB962C8B-B14F-4D97-AF65-F5344CB8AC3E}">
+        <p14:creationId xmlns:p14="http://schemas.microsoft.com/office/powerpoint/2010/main" val="4287364380"/>
       </p:ext>
     </p:extLst>
   </p:cSld>

</xml_diff>

<commit_message>
Update gitbook 2025-06-09 18:08:28
</commit_message>
<xml_diff>
--- a/MeetTeam.pptx
+++ b/MeetTeam.pptx
@@ -5,7 +5,7 @@
     <p:sldMasterId id="2147483684" r:id="rId1"/>
   </p:sldMasterIdLst>
   <p:notesMasterIdLst>
-    <p:notesMasterId r:id="rId10"/>
+    <p:notesMasterId r:id="rId12"/>
   </p:notesMasterIdLst>
   <p:sldIdLst>
     <p:sldId id="256" r:id="rId2"/>
@@ -15,19 +15,21 @@
     <p:sldId id="260" r:id="rId6"/>
     <p:sldId id="390" r:id="rId7"/>
     <p:sldId id="391" r:id="rId8"/>
-    <p:sldId id="386" r:id="rId9"/>
+    <p:sldId id="384" r:id="rId9"/>
+    <p:sldId id="393" r:id="rId10"/>
+    <p:sldId id="386" r:id="rId11"/>
   </p:sldIdLst>
   <p:sldSz cx="12192000" cy="6858000"/>
   <p:notesSz cx="6858000" cy="9144000"/>
   <p:embeddedFontLst>
     <p:embeddedFont>
       <p:font typeface="Director" pitchFamily="2" charset="0"/>
-      <p:regular r:id="rId11"/>
+      <p:regular r:id="rId13"/>
     </p:embeddedFont>
     <p:embeddedFont>
       <p:font typeface="Inter" panose="02000503000000020004" pitchFamily="2" charset="0"/>
-      <p:regular r:id="rId12"/>
-      <p:bold r:id="rId13"/>
+      <p:regular r:id="rId14"/>
+      <p:bold r:id="rId15"/>
     </p:embeddedFont>
   </p:embeddedFontLst>
   <p:defaultTextStyle>
@@ -215,7 +217,7 @@
           <a:p>
             <a:fld id="{7CF2004C-AD6B-4A9A-A490-3730F26EBC0C}" type="datetimeFigureOut">
               <a:rPr lang="en-US" smtClean="0"/>
-              <a:t>6/4/2025</a:t>
+              <a:t>6/9/2025</a:t>
             </a:fld>
             <a:endParaRPr lang="en-US"/>
           </a:p>
@@ -613,7 +615,7 @@
           <a:p>
             <a:fld id="{2E6CAD52-DA28-4E78-92DA-C35A0DBEE03A}" type="datetimeFigureOut">
               <a:rPr lang="en-US" smtClean="0"/>
-              <a:t>6/4/2025</a:t>
+              <a:t>6/9/2025</a:t>
             </a:fld>
             <a:endParaRPr lang="en-US"/>
           </a:p>
@@ -783,7 +785,7 @@
           <a:p>
             <a:fld id="{2E6CAD52-DA28-4E78-92DA-C35A0DBEE03A}" type="datetimeFigureOut">
               <a:rPr lang="en-US" smtClean="0"/>
-              <a:t>6/4/2025</a:t>
+              <a:t>6/9/2025</a:t>
             </a:fld>
             <a:endParaRPr lang="en-US"/>
           </a:p>
@@ -963,7 +965,7 @@
           <a:p>
             <a:fld id="{2E6CAD52-DA28-4E78-92DA-C35A0DBEE03A}" type="datetimeFigureOut">
               <a:rPr lang="en-US" smtClean="0"/>
-              <a:t>6/4/2025</a:t>
+              <a:t>6/9/2025</a:t>
             </a:fld>
             <a:endParaRPr lang="en-US"/>
           </a:p>
@@ -1133,7 +1135,7 @@
           <a:p>
             <a:fld id="{2E6CAD52-DA28-4E78-92DA-C35A0DBEE03A}" type="datetimeFigureOut">
               <a:rPr lang="en-US" smtClean="0"/>
-              <a:t>6/4/2025</a:t>
+              <a:t>6/9/2025</a:t>
             </a:fld>
             <a:endParaRPr lang="en-US"/>
           </a:p>
@@ -1379,7 +1381,7 @@
           <a:p>
             <a:fld id="{2E6CAD52-DA28-4E78-92DA-C35A0DBEE03A}" type="datetimeFigureOut">
               <a:rPr lang="en-US" smtClean="0"/>
-              <a:t>6/4/2025</a:t>
+              <a:t>6/9/2025</a:t>
             </a:fld>
             <a:endParaRPr lang="en-US"/>
           </a:p>
@@ -1611,7 +1613,7 @@
           <a:p>
             <a:fld id="{2E6CAD52-DA28-4E78-92DA-C35A0DBEE03A}" type="datetimeFigureOut">
               <a:rPr lang="en-US" smtClean="0"/>
-              <a:t>6/4/2025</a:t>
+              <a:t>6/9/2025</a:t>
             </a:fld>
             <a:endParaRPr lang="en-US"/>
           </a:p>
@@ -1978,7 +1980,7 @@
           <a:p>
             <a:fld id="{2E6CAD52-DA28-4E78-92DA-C35A0DBEE03A}" type="datetimeFigureOut">
               <a:rPr lang="en-US" smtClean="0"/>
-              <a:t>6/4/2025</a:t>
+              <a:t>6/9/2025</a:t>
             </a:fld>
             <a:endParaRPr lang="en-US"/>
           </a:p>
@@ -2096,7 +2098,7 @@
           <a:p>
             <a:fld id="{2E6CAD52-DA28-4E78-92DA-C35A0DBEE03A}" type="datetimeFigureOut">
               <a:rPr lang="en-US" smtClean="0"/>
-              <a:t>6/4/2025</a:t>
+              <a:t>6/9/2025</a:t>
             </a:fld>
             <a:endParaRPr lang="en-US"/>
           </a:p>
@@ -2191,7 +2193,7 @@
           <a:p>
             <a:fld id="{2E6CAD52-DA28-4E78-92DA-C35A0DBEE03A}" type="datetimeFigureOut">
               <a:rPr lang="en-US" smtClean="0"/>
-              <a:t>6/4/2025</a:t>
+              <a:t>6/9/2025</a:t>
             </a:fld>
             <a:endParaRPr lang="en-US"/>
           </a:p>
@@ -2468,7 +2470,7 @@
           <a:p>
             <a:fld id="{2E6CAD52-DA28-4E78-92DA-C35A0DBEE03A}" type="datetimeFigureOut">
               <a:rPr lang="en-US" smtClean="0"/>
-              <a:t>6/4/2025</a:t>
+              <a:t>6/9/2025</a:t>
             </a:fld>
             <a:endParaRPr lang="en-US"/>
           </a:p>
@@ -2725,7 +2727,7 @@
           <a:p>
             <a:fld id="{2E6CAD52-DA28-4E78-92DA-C35A0DBEE03A}" type="datetimeFigureOut">
               <a:rPr lang="en-US" smtClean="0"/>
-              <a:t>6/4/2025</a:t>
+              <a:t>6/9/2025</a:t>
             </a:fld>
             <a:endParaRPr lang="en-US"/>
           </a:p>
@@ -2938,7 +2940,7 @@
           <a:p>
             <a:fld id="{2E6CAD52-DA28-4E78-92DA-C35A0DBEE03A}" type="datetimeFigureOut">
               <a:rPr lang="en-US" smtClean="0"/>
-              <a:t>6/4/2025</a:t>
+              <a:t>6/9/2025</a:t>
             </a:fld>
             <a:endParaRPr lang="en-US"/>
           </a:p>
@@ -3438,6 +3440,97 @@
 </p:sld>
 </file>
 
+<file path=ppt/slides/slide10.xml><?xml version="1.0" encoding="utf-8"?>
+<p:sld xmlns:a="http://schemas.openxmlformats.org/drawingml/2006/main" xmlns:r="http://schemas.openxmlformats.org/officeDocument/2006/relationships" xmlns:p="http://schemas.openxmlformats.org/presentationml/2006/main">
+  <p:cSld>
+    <p:spTree>
+      <p:nvGrpSpPr>
+        <p:cNvPr id="1" name=""/>
+        <p:cNvGrpSpPr/>
+        <p:nvPr/>
+      </p:nvGrpSpPr>
+      <p:grpSpPr>
+        <a:xfrm>
+          <a:off x="0" y="0"/>
+          <a:ext cx="0" cy="0"/>
+          <a:chOff x="0" y="0"/>
+          <a:chExt cx="0" cy="0"/>
+        </a:xfrm>
+      </p:grpSpPr>
+      <p:sp>
+        <p:nvSpPr>
+          <p:cNvPr id="2" name="Title 1">
+            <a:extLst>
+              <a:ext uri="{FF2B5EF4-FFF2-40B4-BE49-F238E27FC236}">
+                <a16:creationId xmlns:a16="http://schemas.microsoft.com/office/drawing/2014/main" id="{01F9C0DC-B238-3823-59FF-55A5FC4212E1}"/>
+              </a:ext>
+            </a:extLst>
+          </p:cNvPr>
+          <p:cNvSpPr>
+            <a:spLocks noGrp="1"/>
+          </p:cNvSpPr>
+          <p:nvPr>
+            <p:ph type="title"/>
+          </p:nvPr>
+        </p:nvSpPr>
+        <p:spPr/>
+        <p:txBody>
+          <a:bodyPr/>
+          <a:lstStyle/>
+          <a:p>
+            <a:r>
+              <a:rPr lang="en-US" dirty="0"/>
+              <a:t>THANK YOU</a:t>
+            </a:r>
+          </a:p>
+        </p:txBody>
+      </p:sp>
+      <p:sp>
+        <p:nvSpPr>
+          <p:cNvPr id="3" name="Text Placeholder 2">
+            <a:extLst>
+              <a:ext uri="{FF2B5EF4-FFF2-40B4-BE49-F238E27FC236}">
+                <a16:creationId xmlns:a16="http://schemas.microsoft.com/office/drawing/2014/main" id="{13F25B73-B2E7-9DC4-7B36-887C5D620742}"/>
+              </a:ext>
+            </a:extLst>
+          </p:cNvPr>
+          <p:cNvSpPr>
+            <a:spLocks noGrp="1"/>
+          </p:cNvSpPr>
+          <p:nvPr>
+            <p:ph type="body" idx="1"/>
+          </p:nvPr>
+        </p:nvSpPr>
+        <p:spPr/>
+        <p:txBody>
+          <a:bodyPr/>
+          <a:lstStyle/>
+          <a:p>
+            <a:r>
+              <a:rPr lang="en-US" i="1" dirty="0"/>
+              <a:t>lunch </a:t>
+            </a:r>
+            <a:r>
+              <a:rPr lang="en-US" i="1"/>
+              <a:t>is next!</a:t>
+            </a:r>
+            <a:endParaRPr lang="en-US" i="1" dirty="0"/>
+          </a:p>
+        </p:txBody>
+      </p:sp>
+    </p:spTree>
+    <p:extLst>
+      <p:ext uri="{BB962C8B-B14F-4D97-AF65-F5344CB8AC3E}">
+        <p14:creationId xmlns:p14="http://schemas.microsoft.com/office/powerpoint/2010/main" val="271307970"/>
+      </p:ext>
+    </p:extLst>
+  </p:cSld>
+  <p:clrMapOvr>
+    <a:masterClrMapping/>
+  </p:clrMapOvr>
+</p:sld>
+</file>
+
 <file path=ppt/slides/slide2.xml><?xml version="1.0" encoding="utf-8"?>
 <p:sld xmlns:a="http://schemas.openxmlformats.org/drawingml/2006/main" xmlns:r="http://schemas.openxmlformats.org/officeDocument/2006/relationships" xmlns:p="http://schemas.openxmlformats.org/presentationml/2006/main">
   <p:cSld>
@@ -3520,7 +3613,7 @@
             </a:pPr>
             <a:r>
               <a:rPr lang="en-US" dirty="0"/>
-              <a:t>Calendar / Working Hours</a:t>
+              <a:t>Overview</a:t>
             </a:r>
           </a:p>
           <a:p>
@@ -3798,6 +3891,16 @@
             <a:r>
               <a:rPr lang="en-US" sz="4400" b="1" dirty="0"/>
               <a:t>be professional</a:t>
+            </a:r>
+          </a:p>
+          <a:p>
+            <a:r>
+              <a:rPr lang="en-US" sz="4400" dirty="0"/>
+              <a:t>Calendar: </a:t>
+            </a:r>
+            <a:r>
+              <a:rPr lang="en-US" sz="4400" b="1" dirty="0"/>
+              <a:t>check Outlook</a:t>
             </a:r>
           </a:p>
           <a:p>
@@ -4026,6 +4129,55 @@
                       </p:childTnLst>
                     </p:cTn>
                   </p:par>
+                  <p:par>
+                    <p:cTn id="19" fill="hold">
+                      <p:stCondLst>
+                        <p:cond delay="indefinite"/>
+                      </p:stCondLst>
+                      <p:childTnLst>
+                        <p:par>
+                          <p:cTn id="20" fill="hold">
+                            <p:stCondLst>
+                              <p:cond delay="0"/>
+                            </p:stCondLst>
+                            <p:childTnLst>
+                              <p:par>
+                                <p:cTn id="21" presetID="1" presetClass="entr" presetSubtype="0" fill="hold" nodeType="clickEffect">
+                                  <p:stCondLst>
+                                    <p:cond delay="0"/>
+                                  </p:stCondLst>
+                                  <p:childTnLst>
+                                    <p:set>
+                                      <p:cBhvr>
+                                        <p:cTn id="22" dur="1" fill="hold">
+                                          <p:stCondLst>
+                                            <p:cond delay="0"/>
+                                          </p:stCondLst>
+                                        </p:cTn>
+                                        <p:tgtEl>
+                                          <p:spTgt spid="3">
+                                            <p:txEl>
+                                              <p:pRg st="4" end="4"/>
+                                            </p:txEl>
+                                          </p:spTgt>
+                                        </p:tgtEl>
+                                        <p:attrNameLst>
+                                          <p:attrName>style.visibility</p:attrName>
+                                        </p:attrNameLst>
+                                      </p:cBhvr>
+                                      <p:to>
+                                        <p:strVal val="visible"/>
+                                      </p:to>
+                                    </p:set>
+                                  </p:childTnLst>
+                                </p:cTn>
+                              </p:par>
+                            </p:childTnLst>
+                          </p:cTn>
+                        </p:par>
+                      </p:childTnLst>
+                    </p:cTn>
+                  </p:par>
                 </p:childTnLst>
               </p:cTn>
               <p:prevCondLst>
@@ -4284,14 +4436,14 @@
             <p:ph idx="1"/>
             <p:extLst>
               <p:ext uri="{D42A27DB-BD31-4B8C-83A1-F6EECF244321}">
-                <p14:modId xmlns:p14="http://schemas.microsoft.com/office/powerpoint/2010/main" val="1763560166"/>
+                <p14:modId xmlns:p14="http://schemas.microsoft.com/office/powerpoint/2010/main" val="1455492509"/>
               </p:ext>
             </p:extLst>
           </p:nvPr>
         </p:nvGraphicFramePr>
         <p:xfrm>
-          <a:off x="838200" y="1666239"/>
-          <a:ext cx="10515600" cy="4513845"/>
+          <a:off x="838200" y="1690688"/>
+          <a:ext cx="10515600" cy="4329144"/>
         </p:xfrm>
         <a:graphic>
           <a:graphicData uri="http://schemas.openxmlformats.org/drawingml/2006/table">
@@ -4315,7 +4467,7 @@
                   </a:extLst>
                 </a:gridCol>
               </a:tblGrid>
-              <a:tr h="902769">
+              <a:tr h="721524">
                 <a:tc>
                   <a:txBody>
                     <a:bodyPr/>
@@ -4350,7 +4502,7 @@
                   </a:ext>
                 </a:extLst>
               </a:tr>
-              <a:tr h="902769">
+              <a:tr h="721524">
                 <a:tc>
                   <a:txBody>
                     <a:bodyPr/>
@@ -4385,7 +4537,7 @@
                   </a:ext>
                 </a:extLst>
               </a:tr>
-              <a:tr h="902769">
+              <a:tr h="721524">
                 <a:tc>
                   <a:txBody>
                     <a:bodyPr/>
@@ -4420,7 +4572,7 @@
                   </a:ext>
                 </a:extLst>
               </a:tr>
-              <a:tr h="902769">
+              <a:tr h="721524">
                 <a:tc>
                   <a:txBody>
                     <a:bodyPr/>
@@ -4455,7 +4607,7 @@
                   </a:ext>
                 </a:extLst>
               </a:tr>
-              <a:tr h="902769">
+              <a:tr h="721524">
                 <a:tc>
                   <a:txBody>
                     <a:bodyPr/>
@@ -4464,7 +4616,42 @@
                       <a:pPr algn="ctr"/>
                       <a:r>
                         <a:rPr lang="en-US" sz="2800" dirty="0"/>
-                        <a:t>2:00pm-4:00pm</a:t>
+                        <a:t>2:00pm-2:30pm</a:t>
+                      </a:r>
+                    </a:p>
+                  </a:txBody>
+                  <a:tcPr anchor="ctr"/>
+                </a:tc>
+                <a:tc>
+                  <a:txBody>
+                    <a:bodyPr/>
+                    <a:lstStyle/>
+                    <a:p>
+                      <a:pPr algn="ctr"/>
+                      <a:r>
+                        <a:rPr lang="en-US" sz="2800" dirty="0"/>
+                        <a:t>Tech Outreach Team Meeting</a:t>
+                      </a:r>
+                    </a:p>
+                  </a:txBody>
+                  <a:tcPr anchor="ctr"/>
+                </a:tc>
+                <a:extLst>
+                  <a:ext uri="{0D108BD9-81ED-4DB2-BD59-A6C34878D82A}">
+                    <a16:rowId xmlns:a16="http://schemas.microsoft.com/office/drawing/2014/main" val="2971069475"/>
+                  </a:ext>
+                </a:extLst>
+              </a:tr>
+              <a:tr h="721524">
+                <a:tc>
+                  <a:txBody>
+                    <a:bodyPr/>
+                    <a:lstStyle/>
+                    <a:p>
+                      <a:pPr algn="ctr"/>
+                      <a:r>
+                        <a:rPr lang="en-US" sz="2800" dirty="0"/>
+                        <a:t>2:30pm-4:00pm</a:t>
                       </a:r>
                     </a:p>
                   </a:txBody>
@@ -4486,7 +4673,7 @@
                 </a:tc>
                 <a:extLst>
                   <a:ext uri="{0D108BD9-81ED-4DB2-BD59-A6C34878D82A}">
-                    <a16:rowId xmlns:a16="http://schemas.microsoft.com/office/drawing/2014/main" val="2971069475"/>
+                    <a16:rowId xmlns:a16="http://schemas.microsoft.com/office/drawing/2014/main" val="2648002610"/>
                   </a:ext>
                 </a:extLst>
               </a:tr>
@@ -4529,7 +4716,7 @@
           <p:cNvPr id="2" name="Title 1">
             <a:extLst>
               <a:ext uri="{FF2B5EF4-FFF2-40B4-BE49-F238E27FC236}">
-                <a16:creationId xmlns:a16="http://schemas.microsoft.com/office/drawing/2014/main" id="{01F9C0DC-B238-3823-59FF-55A5FC4212E1}"/>
+                <a16:creationId xmlns:a16="http://schemas.microsoft.com/office/drawing/2014/main" id="{FF843D9E-7C2E-489A-A90C-948A9ED5E242}"/>
               </a:ext>
             </a:extLst>
           </p:cNvPr>
@@ -4542,12 +4729,14 @@
         </p:nvSpPr>
         <p:spPr/>
         <p:txBody>
-          <a:bodyPr/>
-          <a:lstStyle/>
-          <a:p>
-            <a:r>
-              <a:rPr lang="en-US" dirty="0"/>
-              <a:t>THANK YOU</a:t>
+          <a:bodyPr>
+            <a:normAutofit/>
+          </a:bodyPr>
+          <a:lstStyle/>
+          <a:p>
+            <a:r>
+              <a:rPr lang="en-US" sz="5400" dirty="0"/>
+              <a:t>First Week Checklist</a:t>
             </a:r>
           </a:p>
         </p:txBody>
@@ -4557,7 +4746,7 @@
           <p:cNvPr id="3" name="Text Placeholder 2">
             <a:extLst>
               <a:ext uri="{FF2B5EF4-FFF2-40B4-BE49-F238E27FC236}">
-                <a16:creationId xmlns:a16="http://schemas.microsoft.com/office/drawing/2014/main" id="{13F25B73-B2E7-9DC4-7B36-887C5D620742}"/>
+                <a16:creationId xmlns:a16="http://schemas.microsoft.com/office/drawing/2014/main" id="{03ADFC6A-6F87-9200-21AC-FE0965ED13DA}"/>
               </a:ext>
             </a:extLst>
           </p:cNvPr>
@@ -4574,21 +4763,652 @@
           <a:lstStyle/>
           <a:p>
             <a:r>
+              <a:rPr lang="en-US" i="1" dirty="0" err="1"/>
+              <a:t>gotta</a:t>
+            </a:r>
+            <a:r>
               <a:rPr lang="en-US" i="1" dirty="0"/>
-              <a:t>lunch </a:t>
-            </a:r>
-            <a:r>
-              <a:rPr lang="en-US" i="1"/>
-              <a:t>is next!</a:t>
-            </a:r>
-            <a:endParaRPr lang="en-US" i="1" dirty="0"/>
+              <a:t> check ‘</a:t>
+            </a:r>
+            <a:r>
+              <a:rPr lang="en-US" i="1" dirty="0" err="1"/>
+              <a:t>em</a:t>
+            </a:r>
+            <a:r>
+              <a:rPr lang="en-US" i="1" dirty="0"/>
+              <a:t> all!</a:t>
+            </a:r>
           </a:p>
         </p:txBody>
       </p:sp>
     </p:spTree>
     <p:extLst>
       <p:ext uri="{BB962C8B-B14F-4D97-AF65-F5344CB8AC3E}">
-        <p14:creationId xmlns:p14="http://schemas.microsoft.com/office/powerpoint/2010/main" val="271307970"/>
+        <p14:creationId xmlns:p14="http://schemas.microsoft.com/office/powerpoint/2010/main" val="965477525"/>
+      </p:ext>
+    </p:extLst>
+  </p:cSld>
+  <p:clrMapOvr>
+    <a:masterClrMapping/>
+  </p:clrMapOvr>
+</p:sld>
+</file>
+
+<file path=ppt/slides/slide9.xml><?xml version="1.0" encoding="utf-8"?>
+<p:sld xmlns:a="http://schemas.openxmlformats.org/drawingml/2006/main" xmlns:r="http://schemas.openxmlformats.org/officeDocument/2006/relationships" xmlns:p="http://schemas.openxmlformats.org/presentationml/2006/main">
+  <p:cSld>
+    <p:spTree>
+      <p:nvGrpSpPr>
+        <p:cNvPr id="1" name=""/>
+        <p:cNvGrpSpPr/>
+        <p:nvPr/>
+      </p:nvGrpSpPr>
+      <p:grpSpPr>
+        <a:xfrm>
+          <a:off x="0" y="0"/>
+          <a:ext cx="0" cy="0"/>
+          <a:chOff x="0" y="0"/>
+          <a:chExt cx="0" cy="0"/>
+        </a:xfrm>
+      </p:grpSpPr>
+      <p:sp>
+        <p:nvSpPr>
+          <p:cNvPr id="3" name="TextBox 2">
+            <a:extLst>
+              <a:ext uri="{FF2B5EF4-FFF2-40B4-BE49-F238E27FC236}">
+                <a16:creationId xmlns:a16="http://schemas.microsoft.com/office/drawing/2014/main" id="{4DD078B1-774A-E2CA-DDD3-924CFDB12040}"/>
+              </a:ext>
+            </a:extLst>
+          </p:cNvPr>
+          <p:cNvSpPr txBox="1"/>
+          <p:nvPr/>
+        </p:nvSpPr>
+        <p:spPr>
+          <a:xfrm>
+            <a:off x="426720" y="1762805"/>
+            <a:ext cx="5303520" cy="3332387"/>
+          </a:xfrm>
+          <a:prstGeom prst="rect">
+            <a:avLst/>
+          </a:prstGeom>
+          <a:noFill/>
+        </p:spPr>
+        <p:txBody>
+          <a:bodyPr wrap="square">
+            <a:spAutoFit/>
+          </a:bodyPr>
+          <a:lstStyle/>
+          <a:p>
+            <a:pPr marL="342900" marR="0" lvl="0" indent="-342900">
+              <a:lnSpc>
+                <a:spcPts val="3200"/>
+              </a:lnSpc>
+              <a:spcBef>
+                <a:spcPts val="0"/>
+              </a:spcBef>
+              <a:spcAft>
+                <a:spcPts val="0"/>
+              </a:spcAft>
+              <a:buFont typeface="Wingdings" panose="05000000000000000000" pitchFamily="2" charset="2"/>
+              <a:buChar char=""/>
+            </a:pPr>
+            <a:r>
+              <a:rPr lang="en-US" sz="1800" dirty="0">
+                <a:effectLst/>
+                <a:latin typeface="Inter" panose="02000503000000020004" pitchFamily="2" charset="0"/>
+                <a:ea typeface="Calibri" panose="020F0502020204030204" pitchFamily="34" charset="0"/>
+                <a:cs typeface="Times New Roman" panose="02020603050405020304" pitchFamily="18" charset="0"/>
+              </a:rPr>
+              <a:t>Visit the internship homepage</a:t>
+            </a:r>
+            <a:endParaRPr lang="en-US" sz="1400" dirty="0">
+              <a:effectLst/>
+              <a:latin typeface="Calibri" panose="020F0502020204030204" pitchFamily="34" charset="0"/>
+              <a:ea typeface="Calibri" panose="020F0502020204030204" pitchFamily="34" charset="0"/>
+              <a:cs typeface="Times New Roman" panose="02020603050405020304" pitchFamily="18" charset="0"/>
+            </a:endParaRPr>
+          </a:p>
+          <a:p>
+            <a:pPr marL="342900" marR="0" lvl="0" indent="-342900">
+              <a:lnSpc>
+                <a:spcPts val="3200"/>
+              </a:lnSpc>
+              <a:spcBef>
+                <a:spcPts val="0"/>
+              </a:spcBef>
+              <a:spcAft>
+                <a:spcPts val="0"/>
+              </a:spcAft>
+              <a:buFont typeface="Wingdings" panose="05000000000000000000" pitchFamily="2" charset="2"/>
+              <a:buChar char=""/>
+            </a:pPr>
+            <a:r>
+              <a:rPr lang="en-US" sz="1800" dirty="0">
+                <a:effectLst/>
+                <a:latin typeface="Inter" panose="02000503000000020004" pitchFamily="2" charset="0"/>
+                <a:ea typeface="Calibri" panose="020F0502020204030204" pitchFamily="34" charset="0"/>
+                <a:cs typeface="Times New Roman" panose="02020603050405020304" pitchFamily="18" charset="0"/>
+              </a:rPr>
+              <a:t>Change your desktop background</a:t>
+            </a:r>
+            <a:endParaRPr lang="en-US" sz="1400" dirty="0">
+              <a:effectLst/>
+              <a:latin typeface="Calibri" panose="020F0502020204030204" pitchFamily="34" charset="0"/>
+              <a:ea typeface="Calibri" panose="020F0502020204030204" pitchFamily="34" charset="0"/>
+              <a:cs typeface="Times New Roman" panose="02020603050405020304" pitchFamily="18" charset="0"/>
+            </a:endParaRPr>
+          </a:p>
+          <a:p>
+            <a:pPr marL="342900" marR="0" lvl="0" indent="-342900">
+              <a:lnSpc>
+                <a:spcPts val="3200"/>
+              </a:lnSpc>
+              <a:spcBef>
+                <a:spcPts val="0"/>
+              </a:spcBef>
+              <a:spcAft>
+                <a:spcPts val="0"/>
+              </a:spcAft>
+              <a:buFont typeface="Wingdings" panose="05000000000000000000" pitchFamily="2" charset="2"/>
+              <a:buChar char=""/>
+            </a:pPr>
+            <a:r>
+              <a:rPr lang="en-US" sz="1800" dirty="0">
+                <a:effectLst/>
+                <a:latin typeface="Inter" panose="02000503000000020004" pitchFamily="2" charset="0"/>
+                <a:ea typeface="Calibri" panose="020F0502020204030204" pitchFamily="34" charset="0"/>
+                <a:cs typeface="Times New Roman" panose="02020603050405020304" pitchFamily="18" charset="0"/>
+              </a:rPr>
+              <a:t>Play a game of ping pong</a:t>
+            </a:r>
+            <a:endParaRPr lang="en-US" sz="1400" dirty="0">
+              <a:effectLst/>
+              <a:latin typeface="Calibri" panose="020F0502020204030204" pitchFamily="34" charset="0"/>
+              <a:ea typeface="Calibri" panose="020F0502020204030204" pitchFamily="34" charset="0"/>
+              <a:cs typeface="Times New Roman" panose="02020603050405020304" pitchFamily="18" charset="0"/>
+            </a:endParaRPr>
+          </a:p>
+          <a:p>
+            <a:pPr marL="342900" marR="0" lvl="0" indent="-342900">
+              <a:lnSpc>
+                <a:spcPts val="3200"/>
+              </a:lnSpc>
+              <a:spcBef>
+                <a:spcPts val="0"/>
+              </a:spcBef>
+              <a:spcAft>
+                <a:spcPts val="0"/>
+              </a:spcAft>
+              <a:buFont typeface="Wingdings" panose="05000000000000000000" pitchFamily="2" charset="2"/>
+              <a:buChar char=""/>
+            </a:pPr>
+            <a:r>
+              <a:rPr lang="en-US" sz="1800" dirty="0">
+                <a:effectLst/>
+                <a:latin typeface="Inter" panose="02000503000000020004" pitchFamily="2" charset="0"/>
+                <a:ea typeface="Calibri" panose="020F0502020204030204" pitchFamily="34" charset="0"/>
+                <a:cs typeface="Times New Roman" panose="02020603050405020304" pitchFamily="18" charset="0"/>
+              </a:rPr>
+              <a:t>Watch a video from the Fun Things page</a:t>
+            </a:r>
+            <a:endParaRPr lang="en-US" sz="1400" dirty="0">
+              <a:effectLst/>
+              <a:latin typeface="Calibri" panose="020F0502020204030204" pitchFamily="34" charset="0"/>
+              <a:ea typeface="Calibri" panose="020F0502020204030204" pitchFamily="34" charset="0"/>
+              <a:cs typeface="Times New Roman" panose="02020603050405020304" pitchFamily="18" charset="0"/>
+            </a:endParaRPr>
+          </a:p>
+          <a:p>
+            <a:pPr marL="342900" marR="0" lvl="0" indent="-342900">
+              <a:lnSpc>
+                <a:spcPts val="3200"/>
+              </a:lnSpc>
+              <a:spcBef>
+                <a:spcPts val="0"/>
+              </a:spcBef>
+              <a:spcAft>
+                <a:spcPts val="0"/>
+              </a:spcAft>
+              <a:buFont typeface="Wingdings" panose="05000000000000000000" pitchFamily="2" charset="2"/>
+              <a:buChar char=""/>
+            </a:pPr>
+            <a:r>
+              <a:rPr lang="en-US" sz="1800" dirty="0">
+                <a:effectLst/>
+                <a:latin typeface="Inter" panose="02000503000000020004" pitchFamily="2" charset="0"/>
+                <a:ea typeface="Calibri" panose="020F0502020204030204" pitchFamily="34" charset="0"/>
+                <a:cs typeface="Times New Roman" panose="02020603050405020304" pitchFamily="18" charset="0"/>
+              </a:rPr>
+              <a:t>Complete one of the learning path items</a:t>
+            </a:r>
+            <a:endParaRPr lang="en-US" sz="1400" dirty="0">
+              <a:effectLst/>
+              <a:latin typeface="Calibri" panose="020F0502020204030204" pitchFamily="34" charset="0"/>
+              <a:ea typeface="Calibri" panose="020F0502020204030204" pitchFamily="34" charset="0"/>
+              <a:cs typeface="Times New Roman" panose="02020603050405020304" pitchFamily="18" charset="0"/>
+            </a:endParaRPr>
+          </a:p>
+          <a:p>
+            <a:pPr marL="342900" marR="0" lvl="0" indent="-342900">
+              <a:lnSpc>
+                <a:spcPts val="3200"/>
+              </a:lnSpc>
+              <a:spcBef>
+                <a:spcPts val="0"/>
+              </a:spcBef>
+              <a:spcAft>
+                <a:spcPts val="0"/>
+              </a:spcAft>
+              <a:buFont typeface="Wingdings" panose="05000000000000000000" pitchFamily="2" charset="2"/>
+              <a:buChar char=""/>
+            </a:pPr>
+            <a:r>
+              <a:rPr lang="en-US" sz="1800" dirty="0">
+                <a:effectLst/>
+                <a:latin typeface="Inter" panose="02000503000000020004" pitchFamily="2" charset="0"/>
+                <a:ea typeface="Calibri" panose="020F0502020204030204" pitchFamily="34" charset="0"/>
+                <a:cs typeface="Times New Roman" panose="02020603050405020304" pitchFamily="18" charset="0"/>
+              </a:rPr>
+              <a:t>Work somewhere other than your desk</a:t>
+            </a:r>
+            <a:endParaRPr lang="en-US" sz="1400" dirty="0">
+              <a:effectLst/>
+              <a:latin typeface="Calibri" panose="020F0502020204030204" pitchFamily="34" charset="0"/>
+              <a:ea typeface="Calibri" panose="020F0502020204030204" pitchFamily="34" charset="0"/>
+              <a:cs typeface="Times New Roman" panose="02020603050405020304" pitchFamily="18" charset="0"/>
+            </a:endParaRPr>
+          </a:p>
+          <a:p>
+            <a:pPr marL="342900" marR="0" lvl="0" indent="-342900">
+              <a:lnSpc>
+                <a:spcPts val="3200"/>
+              </a:lnSpc>
+              <a:spcBef>
+                <a:spcPts val="0"/>
+              </a:spcBef>
+              <a:spcAft>
+                <a:spcPts val="0"/>
+              </a:spcAft>
+              <a:buFont typeface="Wingdings" panose="05000000000000000000" pitchFamily="2" charset="2"/>
+              <a:buChar char=""/>
+            </a:pPr>
+            <a:r>
+              <a:rPr lang="en-US" sz="1800" dirty="0">
+                <a:effectLst/>
+                <a:latin typeface="Inter" panose="02000503000000020004" pitchFamily="2" charset="0"/>
+                <a:ea typeface="Calibri" panose="020F0502020204030204" pitchFamily="34" charset="0"/>
+                <a:cs typeface="Times New Roman" panose="02020603050405020304" pitchFamily="18" charset="0"/>
+              </a:rPr>
+              <a:t>Send an email from your work account</a:t>
+            </a:r>
+            <a:endParaRPr lang="en-US" sz="1400" dirty="0">
+              <a:effectLst/>
+              <a:latin typeface="Calibri" panose="020F0502020204030204" pitchFamily="34" charset="0"/>
+              <a:ea typeface="Calibri" panose="020F0502020204030204" pitchFamily="34" charset="0"/>
+              <a:cs typeface="Times New Roman" panose="02020603050405020304" pitchFamily="18" charset="0"/>
+            </a:endParaRPr>
+          </a:p>
+          <a:p>
+            <a:pPr marL="342900" marR="0" lvl="0" indent="-342900">
+              <a:lnSpc>
+                <a:spcPts val="3200"/>
+              </a:lnSpc>
+              <a:spcBef>
+                <a:spcPts val="0"/>
+              </a:spcBef>
+              <a:spcAft>
+                <a:spcPts val="0"/>
+              </a:spcAft>
+              <a:buFont typeface="Wingdings" panose="05000000000000000000" pitchFamily="2" charset="2"/>
+              <a:buChar char=""/>
+            </a:pPr>
+            <a:r>
+              <a:rPr lang="en-US" sz="1800" dirty="0">
+                <a:effectLst/>
+                <a:latin typeface="Inter" panose="02000503000000020004" pitchFamily="2" charset="0"/>
+                <a:ea typeface="Calibri" panose="020F0502020204030204" pitchFamily="34" charset="0"/>
+                <a:cs typeface="Times New Roman" panose="02020603050405020304" pitchFamily="18" charset="0"/>
+              </a:rPr>
+              <a:t>Run the </a:t>
+            </a:r>
+            <a:r>
+              <a:rPr lang="en-US" sz="1800" dirty="0" err="1">
+                <a:effectLst/>
+                <a:latin typeface="Inter" panose="02000503000000020004" pitchFamily="2" charset="0"/>
+                <a:ea typeface="Calibri" panose="020F0502020204030204" pitchFamily="34" charset="0"/>
+                <a:cs typeface="Times New Roman" panose="02020603050405020304" pitchFamily="18" charset="0"/>
+              </a:rPr>
+              <a:t>HyTOP</a:t>
+            </a:r>
+            <a:r>
+              <a:rPr lang="en-US" sz="1800" dirty="0">
+                <a:effectLst/>
+                <a:latin typeface="Inter" panose="02000503000000020004" pitchFamily="2" charset="0"/>
+                <a:ea typeface="Calibri" panose="020F0502020204030204" pitchFamily="34" charset="0"/>
+                <a:cs typeface="Times New Roman" panose="02020603050405020304" pitchFamily="18" charset="0"/>
+              </a:rPr>
+              <a:t> application locally</a:t>
+            </a:r>
+            <a:endParaRPr lang="en-US" sz="1400" dirty="0">
+              <a:effectLst/>
+              <a:latin typeface="Calibri" panose="020F0502020204030204" pitchFamily="34" charset="0"/>
+              <a:ea typeface="Calibri" panose="020F0502020204030204" pitchFamily="34" charset="0"/>
+              <a:cs typeface="Times New Roman" panose="02020603050405020304" pitchFamily="18" charset="0"/>
+            </a:endParaRPr>
+          </a:p>
+        </p:txBody>
+      </p:sp>
+      <p:sp>
+        <p:nvSpPr>
+          <p:cNvPr id="7" name="TextBox 6">
+            <a:extLst>
+              <a:ext uri="{FF2B5EF4-FFF2-40B4-BE49-F238E27FC236}">
+                <a16:creationId xmlns:a16="http://schemas.microsoft.com/office/drawing/2014/main" id="{BAF0AA05-6D55-8E35-1081-11689BC6B6D3}"/>
+              </a:ext>
+            </a:extLst>
+          </p:cNvPr>
+          <p:cNvSpPr txBox="1"/>
+          <p:nvPr/>
+        </p:nvSpPr>
+        <p:spPr>
+          <a:xfrm>
+            <a:off x="5730240" y="1557621"/>
+            <a:ext cx="6461760" cy="3742756"/>
+          </a:xfrm>
+          <a:prstGeom prst="rect">
+            <a:avLst/>
+          </a:prstGeom>
+          <a:noFill/>
+        </p:spPr>
+        <p:txBody>
+          <a:bodyPr wrap="square">
+            <a:spAutoFit/>
+          </a:bodyPr>
+          <a:lstStyle/>
+          <a:p>
+            <a:pPr marL="342900" marR="0" lvl="0" indent="-342900">
+              <a:lnSpc>
+                <a:spcPts val="3200"/>
+              </a:lnSpc>
+              <a:spcBef>
+                <a:spcPts val="0"/>
+              </a:spcBef>
+              <a:spcAft>
+                <a:spcPts val="0"/>
+              </a:spcAft>
+              <a:buFont typeface="Wingdings" panose="05000000000000000000" pitchFamily="2" charset="2"/>
+              <a:buChar char=""/>
+            </a:pPr>
+            <a:r>
+              <a:rPr lang="en-US" sz="1800" dirty="0">
+                <a:effectLst/>
+                <a:latin typeface="Inter" panose="02000503000000020004" pitchFamily="2" charset="0"/>
+                <a:ea typeface="Calibri" panose="020F0502020204030204" pitchFamily="34" charset="0"/>
+                <a:cs typeface="Times New Roman" panose="02020603050405020304" pitchFamily="18" charset="0"/>
+              </a:rPr>
+              <a:t>Practice pair programming</a:t>
+            </a:r>
+            <a:endParaRPr lang="en-US" sz="1400" dirty="0">
+              <a:effectLst/>
+              <a:latin typeface="Calibri" panose="020F0502020204030204" pitchFamily="34" charset="0"/>
+              <a:ea typeface="Calibri" panose="020F0502020204030204" pitchFamily="34" charset="0"/>
+              <a:cs typeface="Times New Roman" panose="02020603050405020304" pitchFamily="18" charset="0"/>
+            </a:endParaRPr>
+          </a:p>
+          <a:p>
+            <a:pPr marL="342900" marR="0" lvl="0" indent="-342900">
+              <a:lnSpc>
+                <a:spcPts val="3200"/>
+              </a:lnSpc>
+              <a:spcBef>
+                <a:spcPts val="0"/>
+              </a:spcBef>
+              <a:spcAft>
+                <a:spcPts val="0"/>
+              </a:spcAft>
+              <a:buFont typeface="Wingdings" panose="05000000000000000000" pitchFamily="2" charset="2"/>
+              <a:buChar char=""/>
+            </a:pPr>
+            <a:r>
+              <a:rPr lang="en-US" sz="1800" dirty="0">
+                <a:effectLst/>
+                <a:latin typeface="Inter" panose="02000503000000020004" pitchFamily="2" charset="0"/>
+                <a:ea typeface="Calibri" panose="020F0502020204030204" pitchFamily="34" charset="0"/>
+                <a:cs typeface="Times New Roman" panose="02020603050405020304" pitchFamily="18" charset="0"/>
+              </a:rPr>
+              <a:t>Grab some pretzels, M&amp;Ms, or mints</a:t>
+            </a:r>
+            <a:endParaRPr lang="en-US" sz="1400" dirty="0">
+              <a:effectLst/>
+              <a:latin typeface="Calibri" panose="020F0502020204030204" pitchFamily="34" charset="0"/>
+              <a:ea typeface="Calibri" panose="020F0502020204030204" pitchFamily="34" charset="0"/>
+              <a:cs typeface="Times New Roman" panose="02020603050405020304" pitchFamily="18" charset="0"/>
+            </a:endParaRPr>
+          </a:p>
+          <a:p>
+            <a:pPr marL="342900" marR="0" lvl="0" indent="-342900">
+              <a:lnSpc>
+                <a:spcPts val="3200"/>
+              </a:lnSpc>
+              <a:spcBef>
+                <a:spcPts val="0"/>
+              </a:spcBef>
+              <a:spcAft>
+                <a:spcPts val="0"/>
+              </a:spcAft>
+              <a:buFont typeface="Wingdings" panose="05000000000000000000" pitchFamily="2" charset="2"/>
+              <a:buChar char=""/>
+            </a:pPr>
+            <a:r>
+              <a:rPr lang="en-US" sz="1800" dirty="0">
+                <a:effectLst/>
+                <a:latin typeface="Inter" panose="02000503000000020004" pitchFamily="2" charset="0"/>
+                <a:ea typeface="Calibri" panose="020F0502020204030204" pitchFamily="34" charset="0"/>
+                <a:cs typeface="Times New Roman" panose="02020603050405020304" pitchFamily="18" charset="0"/>
+              </a:rPr>
+              <a:t>Send a Teams message to another intern</a:t>
+            </a:r>
+            <a:endParaRPr lang="en-US" sz="1400" dirty="0">
+              <a:effectLst/>
+              <a:latin typeface="Calibri" panose="020F0502020204030204" pitchFamily="34" charset="0"/>
+              <a:ea typeface="Calibri" panose="020F0502020204030204" pitchFamily="34" charset="0"/>
+              <a:cs typeface="Times New Roman" panose="02020603050405020304" pitchFamily="18" charset="0"/>
+            </a:endParaRPr>
+          </a:p>
+          <a:p>
+            <a:pPr marL="342900" marR="0" lvl="0" indent="-342900">
+              <a:lnSpc>
+                <a:spcPts val="3200"/>
+              </a:lnSpc>
+              <a:spcBef>
+                <a:spcPts val="0"/>
+              </a:spcBef>
+              <a:spcAft>
+                <a:spcPts val="0"/>
+              </a:spcAft>
+              <a:buFont typeface="Wingdings" panose="05000000000000000000" pitchFamily="2" charset="2"/>
+              <a:buChar char=""/>
+            </a:pPr>
+            <a:r>
+              <a:rPr lang="en-US" sz="1800" dirty="0">
+                <a:effectLst/>
+                <a:latin typeface="Inter" panose="02000503000000020004" pitchFamily="2" charset="0"/>
+                <a:ea typeface="Calibri" panose="020F0502020204030204" pitchFamily="34" charset="0"/>
+                <a:cs typeface="Times New Roman" panose="02020603050405020304" pitchFamily="18" charset="0"/>
+              </a:rPr>
+              <a:t>Run into a problem</a:t>
+            </a:r>
+            <a:endParaRPr lang="en-US" sz="1400" dirty="0">
+              <a:effectLst/>
+              <a:latin typeface="Calibri" panose="020F0502020204030204" pitchFamily="34" charset="0"/>
+              <a:ea typeface="Calibri" panose="020F0502020204030204" pitchFamily="34" charset="0"/>
+              <a:cs typeface="Times New Roman" panose="02020603050405020304" pitchFamily="18" charset="0"/>
+            </a:endParaRPr>
+          </a:p>
+          <a:p>
+            <a:pPr marL="342900" marR="0" lvl="0" indent="-342900">
+              <a:lnSpc>
+                <a:spcPts val="3200"/>
+              </a:lnSpc>
+              <a:spcBef>
+                <a:spcPts val="0"/>
+              </a:spcBef>
+              <a:spcAft>
+                <a:spcPts val="0"/>
+              </a:spcAft>
+              <a:buFont typeface="Wingdings" panose="05000000000000000000" pitchFamily="2" charset="2"/>
+              <a:buChar char=""/>
+            </a:pPr>
+            <a:r>
+              <a:rPr lang="en-US" sz="1800" dirty="0">
+                <a:effectLst/>
+                <a:latin typeface="Inter" panose="02000503000000020004" pitchFamily="2" charset="0"/>
+                <a:ea typeface="Calibri" panose="020F0502020204030204" pitchFamily="34" charset="0"/>
+                <a:cs typeface="Times New Roman" panose="02020603050405020304" pitchFamily="18" charset="0"/>
+              </a:rPr>
+              <a:t>Adorn your desk with a decorative item of some kind</a:t>
+            </a:r>
+            <a:endParaRPr lang="en-US" sz="1400" dirty="0">
+              <a:effectLst/>
+              <a:latin typeface="Calibri" panose="020F0502020204030204" pitchFamily="34" charset="0"/>
+              <a:ea typeface="Calibri" panose="020F0502020204030204" pitchFamily="34" charset="0"/>
+              <a:cs typeface="Times New Roman" panose="02020603050405020304" pitchFamily="18" charset="0"/>
+            </a:endParaRPr>
+          </a:p>
+          <a:p>
+            <a:pPr marL="342900" marR="0" lvl="0" indent="-342900">
+              <a:lnSpc>
+                <a:spcPts val="3200"/>
+              </a:lnSpc>
+              <a:spcBef>
+                <a:spcPts val="0"/>
+              </a:spcBef>
+              <a:spcAft>
+                <a:spcPts val="0"/>
+              </a:spcAft>
+              <a:buFont typeface="Wingdings" panose="05000000000000000000" pitchFamily="2" charset="2"/>
+              <a:buChar char=""/>
+            </a:pPr>
+            <a:r>
+              <a:rPr lang="en-US" sz="1800" dirty="0">
+                <a:effectLst/>
+                <a:latin typeface="Inter" panose="02000503000000020004" pitchFamily="2" charset="0"/>
+                <a:ea typeface="Calibri" panose="020F0502020204030204" pitchFamily="34" charset="0"/>
+                <a:cs typeface="Times New Roman" panose="02020603050405020304" pitchFamily="18" charset="0"/>
+              </a:rPr>
+              <a:t>Hack the password protected page</a:t>
+            </a:r>
+            <a:endParaRPr lang="en-US" sz="1400" dirty="0">
+              <a:effectLst/>
+              <a:latin typeface="Calibri" panose="020F0502020204030204" pitchFamily="34" charset="0"/>
+              <a:ea typeface="Calibri" panose="020F0502020204030204" pitchFamily="34" charset="0"/>
+              <a:cs typeface="Times New Roman" panose="02020603050405020304" pitchFamily="18" charset="0"/>
+            </a:endParaRPr>
+          </a:p>
+          <a:p>
+            <a:pPr marL="342900" marR="0" lvl="0" indent="-342900">
+              <a:lnSpc>
+                <a:spcPts val="3200"/>
+              </a:lnSpc>
+              <a:spcBef>
+                <a:spcPts val="0"/>
+              </a:spcBef>
+              <a:spcAft>
+                <a:spcPts val="0"/>
+              </a:spcAft>
+              <a:buFont typeface="Wingdings" panose="05000000000000000000" pitchFamily="2" charset="2"/>
+              <a:buChar char=""/>
+            </a:pPr>
+            <a:r>
+              <a:rPr lang="en-US" sz="1800" dirty="0">
+                <a:effectLst/>
+                <a:latin typeface="Inter" panose="02000503000000020004" pitchFamily="2" charset="0"/>
+                <a:ea typeface="Calibri" panose="020F0502020204030204" pitchFamily="34" charset="0"/>
+                <a:cs typeface="Times New Roman" panose="02020603050405020304" pitchFamily="18" charset="0"/>
+              </a:rPr>
+              <a:t>Practice mob programming</a:t>
+            </a:r>
+            <a:endParaRPr lang="en-US" sz="1400" dirty="0">
+              <a:effectLst/>
+              <a:latin typeface="Calibri" panose="020F0502020204030204" pitchFamily="34" charset="0"/>
+              <a:ea typeface="Calibri" panose="020F0502020204030204" pitchFamily="34" charset="0"/>
+              <a:cs typeface="Times New Roman" panose="02020603050405020304" pitchFamily="18" charset="0"/>
+            </a:endParaRPr>
+          </a:p>
+          <a:p>
+            <a:pPr marL="342900" marR="0" lvl="0" indent="-342900">
+              <a:lnSpc>
+                <a:spcPts val="3200"/>
+              </a:lnSpc>
+              <a:spcBef>
+                <a:spcPts val="0"/>
+              </a:spcBef>
+              <a:spcAft>
+                <a:spcPts val="0"/>
+              </a:spcAft>
+              <a:buFont typeface="Wingdings" panose="05000000000000000000" pitchFamily="2" charset="2"/>
+              <a:buChar char=""/>
+            </a:pPr>
+            <a:r>
+              <a:rPr lang="en-US" sz="1800" dirty="0">
+                <a:effectLst/>
+                <a:latin typeface="Inter" panose="02000503000000020004" pitchFamily="2" charset="0"/>
+                <a:ea typeface="Calibri" panose="020F0502020204030204" pitchFamily="34" charset="0"/>
+                <a:cs typeface="Times New Roman" panose="02020603050405020304" pitchFamily="18" charset="0"/>
+              </a:rPr>
+              <a:t>Get free </a:t>
+            </a:r>
+            <a:r>
+              <a:rPr lang="en-US" dirty="0">
+                <a:latin typeface="Inter" panose="02000503000000020004" pitchFamily="2" charset="0"/>
+                <a:ea typeface="Calibri" panose="020F0502020204030204" pitchFamily="34" charset="0"/>
+                <a:cs typeface="Times New Roman" panose="02020603050405020304" pitchFamily="18" charset="0"/>
+              </a:rPr>
+              <a:t>lunch</a:t>
+            </a:r>
+            <a:endParaRPr lang="en-US" sz="1400" dirty="0">
+              <a:effectLst/>
+              <a:latin typeface="Calibri" panose="020F0502020204030204" pitchFamily="34" charset="0"/>
+              <a:ea typeface="Calibri" panose="020F0502020204030204" pitchFamily="34" charset="0"/>
+              <a:cs typeface="Times New Roman" panose="02020603050405020304" pitchFamily="18" charset="0"/>
+            </a:endParaRPr>
+          </a:p>
+          <a:p>
+            <a:pPr marL="342900" marR="0" lvl="0" indent="-342900">
+              <a:lnSpc>
+                <a:spcPts val="3200"/>
+              </a:lnSpc>
+              <a:spcBef>
+                <a:spcPts val="0"/>
+              </a:spcBef>
+              <a:spcAft>
+                <a:spcPts val="800"/>
+              </a:spcAft>
+              <a:buFont typeface="Wingdings" panose="05000000000000000000" pitchFamily="2" charset="2"/>
+              <a:buChar char=""/>
+            </a:pPr>
+            <a:r>
+              <a:rPr lang="en-US" sz="1800" dirty="0">
+                <a:effectLst/>
+                <a:latin typeface="Inter" panose="02000503000000020004" pitchFamily="2" charset="0"/>
+                <a:ea typeface="Calibri" panose="020F0502020204030204" pitchFamily="34" charset="0"/>
+                <a:cs typeface="Times New Roman" panose="02020603050405020304" pitchFamily="18" charset="0"/>
+              </a:rPr>
+              <a:t>Successfully submit one Pull Request</a:t>
+            </a:r>
+            <a:endParaRPr lang="en-US" sz="1400" dirty="0">
+              <a:effectLst/>
+              <a:latin typeface="Calibri" panose="020F0502020204030204" pitchFamily="34" charset="0"/>
+              <a:ea typeface="Calibri" panose="020F0502020204030204" pitchFamily="34" charset="0"/>
+              <a:cs typeface="Times New Roman" panose="02020603050405020304" pitchFamily="18" charset="0"/>
+            </a:endParaRPr>
+          </a:p>
+        </p:txBody>
+      </p:sp>
+    </p:spTree>
+    <p:extLst>
+      <p:ext uri="{BB962C8B-B14F-4D97-AF65-F5344CB8AC3E}">
+        <p14:creationId xmlns:p14="http://schemas.microsoft.com/office/powerpoint/2010/main" val="4287364380"/>
       </p:ext>
     </p:extLst>
   </p:cSld>

</xml_diff>

<commit_message>
Update gitbook 2025-06-11 13:01:38
</commit_message>
<xml_diff>
--- a/MeetTeam.pptx
+++ b/MeetTeam.pptx
@@ -3899,9 +3899,10 @@
               <a:t>Calendar: </a:t>
             </a:r>
             <a:r>
-              <a:rPr lang="en-US" sz="4400" b="1" dirty="0"/>
-              <a:t>check Outlook</a:t>
-            </a:r>
+              <a:rPr lang="en-US" sz="4400" b="1"/>
+              <a:t>check Outlook ☑️☑️</a:t>
+            </a:r>
+            <a:endParaRPr lang="en-US" sz="4400" b="1" dirty="0"/>
           </a:p>
           <a:p>
             <a:r>

</xml_diff>